<commit_message>
Correction of all pictures
</commit_message>
<xml_diff>
--- a/04 - Cr MagOpt/Picture/6peaks.pptx
+++ b/04 - Cr MagOpt/Picture/6peaks.pptx
@@ -4,16 +4,19 @@
   <p:sldMasterIdLst>
     <p:sldMasterId id="2147483648" r:id="rId1"/>
   </p:sldMasterIdLst>
+  <p:notesMasterIdLst>
+    <p:notesMasterId r:id="rId3"/>
+  </p:notesMasterIdLst>
   <p:sldIdLst>
     <p:sldId id="256" r:id="rId2"/>
   </p:sldIdLst>
-  <p:sldSz cx="12961938" cy="6121400"/>
+  <p:sldSz cx="14941550" cy="6300788"/>
   <p:notesSz cx="6858000" cy="9144000"/>
   <p:defaultTextStyle>
     <a:defPPr>
       <a:defRPr lang="fr-FR"/>
     </a:defPPr>
-    <a:lvl1pPr marL="0" algn="l" defTabSz="1056589" rtl="0" eaLnBrk="1" latinLnBrk="0" hangingPunct="1">
+    <a:lvl1pPr marL="0" algn="l" defTabSz="1075819" rtl="0" eaLnBrk="1" latinLnBrk="0" hangingPunct="1">
       <a:defRPr sz="2100" kern="1200">
         <a:solidFill>
           <a:schemeClr val="tx1"/>
@@ -23,7 +26,7 @@
         <a:cs typeface="+mn-cs"/>
       </a:defRPr>
     </a:lvl1pPr>
-    <a:lvl2pPr marL="528295" algn="l" defTabSz="1056589" rtl="0" eaLnBrk="1" latinLnBrk="0" hangingPunct="1">
+    <a:lvl2pPr marL="537910" algn="l" defTabSz="1075819" rtl="0" eaLnBrk="1" latinLnBrk="0" hangingPunct="1">
       <a:defRPr sz="2100" kern="1200">
         <a:solidFill>
           <a:schemeClr val="tx1"/>
@@ -33,7 +36,7 @@
         <a:cs typeface="+mn-cs"/>
       </a:defRPr>
     </a:lvl2pPr>
-    <a:lvl3pPr marL="1056589" algn="l" defTabSz="1056589" rtl="0" eaLnBrk="1" latinLnBrk="0" hangingPunct="1">
+    <a:lvl3pPr marL="1075819" algn="l" defTabSz="1075819" rtl="0" eaLnBrk="1" latinLnBrk="0" hangingPunct="1">
       <a:defRPr sz="2100" kern="1200">
         <a:solidFill>
           <a:schemeClr val="tx1"/>
@@ -43,7 +46,7 @@
         <a:cs typeface="+mn-cs"/>
       </a:defRPr>
     </a:lvl3pPr>
-    <a:lvl4pPr marL="1584884" algn="l" defTabSz="1056589" rtl="0" eaLnBrk="1" latinLnBrk="0" hangingPunct="1">
+    <a:lvl4pPr marL="1613729" algn="l" defTabSz="1075819" rtl="0" eaLnBrk="1" latinLnBrk="0" hangingPunct="1">
       <a:defRPr sz="2100" kern="1200">
         <a:solidFill>
           <a:schemeClr val="tx1"/>
@@ -53,7 +56,7 @@
         <a:cs typeface="+mn-cs"/>
       </a:defRPr>
     </a:lvl4pPr>
-    <a:lvl5pPr marL="2113178" algn="l" defTabSz="1056589" rtl="0" eaLnBrk="1" latinLnBrk="0" hangingPunct="1">
+    <a:lvl5pPr marL="2151638" algn="l" defTabSz="1075819" rtl="0" eaLnBrk="1" latinLnBrk="0" hangingPunct="1">
       <a:defRPr sz="2100" kern="1200">
         <a:solidFill>
           <a:schemeClr val="tx1"/>
@@ -63,7 +66,7 @@
         <a:cs typeface="+mn-cs"/>
       </a:defRPr>
     </a:lvl5pPr>
-    <a:lvl6pPr marL="2641473" algn="l" defTabSz="1056589" rtl="0" eaLnBrk="1" latinLnBrk="0" hangingPunct="1">
+    <a:lvl6pPr marL="2689548" algn="l" defTabSz="1075819" rtl="0" eaLnBrk="1" latinLnBrk="0" hangingPunct="1">
       <a:defRPr sz="2100" kern="1200">
         <a:solidFill>
           <a:schemeClr val="tx1"/>
@@ -73,7 +76,7 @@
         <a:cs typeface="+mn-cs"/>
       </a:defRPr>
     </a:lvl6pPr>
-    <a:lvl7pPr marL="3169768" algn="l" defTabSz="1056589" rtl="0" eaLnBrk="1" latinLnBrk="0" hangingPunct="1">
+    <a:lvl7pPr marL="3227458" algn="l" defTabSz="1075819" rtl="0" eaLnBrk="1" latinLnBrk="0" hangingPunct="1">
       <a:defRPr sz="2100" kern="1200">
         <a:solidFill>
           <a:schemeClr val="tx1"/>
@@ -83,7 +86,7 @@
         <a:cs typeface="+mn-cs"/>
       </a:defRPr>
     </a:lvl7pPr>
-    <a:lvl8pPr marL="3698062" algn="l" defTabSz="1056589" rtl="0" eaLnBrk="1" latinLnBrk="0" hangingPunct="1">
+    <a:lvl8pPr marL="3765367" algn="l" defTabSz="1075819" rtl="0" eaLnBrk="1" latinLnBrk="0" hangingPunct="1">
       <a:defRPr sz="2100" kern="1200">
         <a:solidFill>
           <a:schemeClr val="tx1"/>
@@ -93,7 +96,7 @@
         <a:cs typeface="+mn-cs"/>
       </a:defRPr>
     </a:lvl8pPr>
-    <a:lvl9pPr marL="4226357" algn="l" defTabSz="1056589" rtl="0" eaLnBrk="1" latinLnBrk="0" hangingPunct="1">
+    <a:lvl9pPr marL="4303277" algn="l" defTabSz="1075819" rtl="0" eaLnBrk="1" latinLnBrk="0" hangingPunct="1">
       <a:defRPr sz="2100" kern="1200">
         <a:solidFill>
           <a:schemeClr val="tx1"/>
@@ -105,6 +108,445 @@
     </a:lvl9pPr>
   </p:defaultTextStyle>
 </p:presentation>
+</file>
+
+<file path=ppt/notesMasters/notesMaster1.xml><?xml version="1.0" encoding="utf-8"?>
+<p:notesMaster xmlns:a="http://schemas.openxmlformats.org/drawingml/2006/main" xmlns:r="http://schemas.openxmlformats.org/officeDocument/2006/relationships" xmlns:p="http://schemas.openxmlformats.org/presentationml/2006/main">
+  <p:cSld>
+    <p:bg>
+      <p:bgRef idx="1001">
+        <a:schemeClr val="bg1"/>
+      </p:bgRef>
+    </p:bg>
+    <p:spTree>
+      <p:nvGrpSpPr>
+        <p:cNvPr id="1" name=""/>
+        <p:cNvGrpSpPr/>
+        <p:nvPr/>
+      </p:nvGrpSpPr>
+      <p:grpSpPr>
+        <a:xfrm>
+          <a:off x="0" y="0"/>
+          <a:ext cx="0" cy="0"/>
+          <a:chOff x="0" y="0"/>
+          <a:chExt cx="0" cy="0"/>
+        </a:xfrm>
+      </p:grpSpPr>
+      <p:sp>
+        <p:nvSpPr>
+          <p:cNvPr id="2" name="Espace réservé de l'en-tête 1"/>
+          <p:cNvSpPr>
+            <a:spLocks noGrp="1"/>
+          </p:cNvSpPr>
+          <p:nvPr>
+            <p:ph type="hdr" sz="quarter"/>
+          </p:nvPr>
+        </p:nvSpPr>
+        <p:spPr>
+          <a:xfrm>
+            <a:off x="0" y="0"/>
+            <a:ext cx="2971800" cy="457200"/>
+          </a:xfrm>
+          <a:prstGeom prst="rect">
+            <a:avLst/>
+          </a:prstGeom>
+        </p:spPr>
+        <p:txBody>
+          <a:bodyPr vert="horz" lIns="91440" tIns="45720" rIns="91440" bIns="45720" rtlCol="0"/>
+          <a:lstStyle>
+            <a:lvl1pPr algn="l">
+              <a:defRPr sz="1200"/>
+            </a:lvl1pPr>
+          </a:lstStyle>
+          <a:p>
+            <a:endParaRPr lang="fr-FR"/>
+          </a:p>
+        </p:txBody>
+      </p:sp>
+      <p:sp>
+        <p:nvSpPr>
+          <p:cNvPr id="3" name="Espace réservé de la date 2"/>
+          <p:cNvSpPr>
+            <a:spLocks noGrp="1"/>
+          </p:cNvSpPr>
+          <p:nvPr>
+            <p:ph type="dt" idx="1"/>
+          </p:nvPr>
+        </p:nvSpPr>
+        <p:spPr>
+          <a:xfrm>
+            <a:off x="3884613" y="0"/>
+            <a:ext cx="2971800" cy="457200"/>
+          </a:xfrm>
+          <a:prstGeom prst="rect">
+            <a:avLst/>
+          </a:prstGeom>
+        </p:spPr>
+        <p:txBody>
+          <a:bodyPr vert="horz" lIns="91440" tIns="45720" rIns="91440" bIns="45720" rtlCol="0"/>
+          <a:lstStyle>
+            <a:lvl1pPr algn="r">
+              <a:defRPr sz="1200"/>
+            </a:lvl1pPr>
+          </a:lstStyle>
+          <a:p>
+            <a:fld id="{71ADB72D-4157-40BD-BB8F-EC580E2842DA}" type="datetimeFigureOut">
+              <a:rPr lang="fr-FR" smtClean="0"/>
+              <a:t>05/04/2017</a:t>
+            </a:fld>
+            <a:endParaRPr lang="fr-FR"/>
+          </a:p>
+        </p:txBody>
+      </p:sp>
+      <p:sp>
+        <p:nvSpPr>
+          <p:cNvPr id="4" name="Espace réservé de l'image des diapositives 3"/>
+          <p:cNvSpPr>
+            <a:spLocks noGrp="1" noRot="1" noChangeAspect="1"/>
+          </p:cNvSpPr>
+          <p:nvPr>
+            <p:ph type="sldImg" idx="2"/>
+          </p:nvPr>
+        </p:nvSpPr>
+        <p:spPr>
+          <a:xfrm>
+            <a:off x="-636588" y="685800"/>
+            <a:ext cx="8131176" cy="3429000"/>
+          </a:xfrm>
+          <a:prstGeom prst="rect">
+            <a:avLst/>
+          </a:prstGeom>
+          <a:noFill/>
+          <a:ln w="12700">
+            <a:solidFill>
+              <a:prstClr val="black"/>
+            </a:solidFill>
+          </a:ln>
+        </p:spPr>
+        <p:txBody>
+          <a:bodyPr vert="horz" lIns="91440" tIns="45720" rIns="91440" bIns="45720" rtlCol="0" anchor="ctr"/>
+          <a:lstStyle/>
+          <a:p>
+            <a:endParaRPr lang="fr-FR"/>
+          </a:p>
+        </p:txBody>
+      </p:sp>
+      <p:sp>
+        <p:nvSpPr>
+          <p:cNvPr id="5" name="Espace réservé des commentaires 4"/>
+          <p:cNvSpPr>
+            <a:spLocks noGrp="1"/>
+          </p:cNvSpPr>
+          <p:nvPr>
+            <p:ph type="body" sz="quarter" idx="3"/>
+          </p:nvPr>
+        </p:nvSpPr>
+        <p:spPr>
+          <a:xfrm>
+            <a:off x="685800" y="4343400"/>
+            <a:ext cx="5486400" cy="4114800"/>
+          </a:xfrm>
+          <a:prstGeom prst="rect">
+            <a:avLst/>
+          </a:prstGeom>
+        </p:spPr>
+        <p:txBody>
+          <a:bodyPr vert="horz" lIns="91440" tIns="45720" rIns="91440" bIns="45720" rtlCol="0"/>
+          <a:lstStyle/>
+          <a:p>
+            <a:pPr lvl="0"/>
+            <a:r>
+              <a:rPr lang="fr-FR" smtClean="0"/>
+              <a:t>Modifiez les styles du texte du masque</a:t>
+            </a:r>
+          </a:p>
+          <a:p>
+            <a:pPr lvl="1"/>
+            <a:r>
+              <a:rPr lang="fr-FR" smtClean="0"/>
+              <a:t>Deuxième niveau</a:t>
+            </a:r>
+          </a:p>
+          <a:p>
+            <a:pPr lvl="2"/>
+            <a:r>
+              <a:rPr lang="fr-FR" smtClean="0"/>
+              <a:t>Troisième niveau</a:t>
+            </a:r>
+          </a:p>
+          <a:p>
+            <a:pPr lvl="3"/>
+            <a:r>
+              <a:rPr lang="fr-FR" smtClean="0"/>
+              <a:t>Quatrième niveau</a:t>
+            </a:r>
+          </a:p>
+          <a:p>
+            <a:pPr lvl="4"/>
+            <a:r>
+              <a:rPr lang="fr-FR" smtClean="0"/>
+              <a:t>Cinquième niveau</a:t>
+            </a:r>
+            <a:endParaRPr lang="fr-FR"/>
+          </a:p>
+        </p:txBody>
+      </p:sp>
+      <p:sp>
+        <p:nvSpPr>
+          <p:cNvPr id="6" name="Espace réservé du pied de page 5"/>
+          <p:cNvSpPr>
+            <a:spLocks noGrp="1"/>
+          </p:cNvSpPr>
+          <p:nvPr>
+            <p:ph type="ftr" sz="quarter" idx="4"/>
+          </p:nvPr>
+        </p:nvSpPr>
+        <p:spPr>
+          <a:xfrm>
+            <a:off x="0" y="8685213"/>
+            <a:ext cx="2971800" cy="457200"/>
+          </a:xfrm>
+          <a:prstGeom prst="rect">
+            <a:avLst/>
+          </a:prstGeom>
+        </p:spPr>
+        <p:txBody>
+          <a:bodyPr vert="horz" lIns="91440" tIns="45720" rIns="91440" bIns="45720" rtlCol="0" anchor="b"/>
+          <a:lstStyle>
+            <a:lvl1pPr algn="l">
+              <a:defRPr sz="1200"/>
+            </a:lvl1pPr>
+          </a:lstStyle>
+          <a:p>
+            <a:endParaRPr lang="fr-FR"/>
+          </a:p>
+        </p:txBody>
+      </p:sp>
+      <p:sp>
+        <p:nvSpPr>
+          <p:cNvPr id="7" name="Espace réservé du numéro de diapositive 6"/>
+          <p:cNvSpPr>
+            <a:spLocks noGrp="1"/>
+          </p:cNvSpPr>
+          <p:nvPr>
+            <p:ph type="sldNum" sz="quarter" idx="5"/>
+          </p:nvPr>
+        </p:nvSpPr>
+        <p:spPr>
+          <a:xfrm>
+            <a:off x="3884613" y="8685213"/>
+            <a:ext cx="2971800" cy="457200"/>
+          </a:xfrm>
+          <a:prstGeom prst="rect">
+            <a:avLst/>
+          </a:prstGeom>
+        </p:spPr>
+        <p:txBody>
+          <a:bodyPr vert="horz" lIns="91440" tIns="45720" rIns="91440" bIns="45720" rtlCol="0" anchor="b"/>
+          <a:lstStyle>
+            <a:lvl1pPr algn="r">
+              <a:defRPr sz="1200"/>
+            </a:lvl1pPr>
+          </a:lstStyle>
+          <a:p>
+            <a:fld id="{42E57144-67B5-4B55-BA48-3E1BA971348D}" type="slidenum">
+              <a:rPr lang="fr-FR" smtClean="0"/>
+              <a:t>‹N°›</a:t>
+            </a:fld>
+            <a:endParaRPr lang="fr-FR"/>
+          </a:p>
+        </p:txBody>
+      </p:sp>
+    </p:spTree>
+    <p:extLst>
+      <p:ext uri="{BB962C8B-B14F-4D97-AF65-F5344CB8AC3E}">
+        <p14:creationId xmlns:p14="http://schemas.microsoft.com/office/powerpoint/2010/main" val="3198367088"/>
+      </p:ext>
+    </p:extLst>
+  </p:cSld>
+  <p:clrMap bg1="lt1" tx1="dk1" bg2="lt2" tx2="dk2" accent1="accent1" accent2="accent2" accent3="accent3" accent4="accent4" accent5="accent5" accent6="accent6" hlink="hlink" folHlink="folHlink"/>
+  <p:notesStyle>
+    <a:lvl1pPr marL="0" algn="l" defTabSz="931042" rtl="0" eaLnBrk="1" latinLnBrk="0" hangingPunct="1">
+      <a:defRPr sz="1200" kern="1200">
+        <a:solidFill>
+          <a:schemeClr val="tx1"/>
+        </a:solidFill>
+        <a:latin typeface="+mn-lt"/>
+        <a:ea typeface="+mn-ea"/>
+        <a:cs typeface="+mn-cs"/>
+      </a:defRPr>
+    </a:lvl1pPr>
+    <a:lvl2pPr marL="465521" algn="l" defTabSz="931042" rtl="0" eaLnBrk="1" latinLnBrk="0" hangingPunct="1">
+      <a:defRPr sz="1200" kern="1200">
+        <a:solidFill>
+          <a:schemeClr val="tx1"/>
+        </a:solidFill>
+        <a:latin typeface="+mn-lt"/>
+        <a:ea typeface="+mn-ea"/>
+        <a:cs typeface="+mn-cs"/>
+      </a:defRPr>
+    </a:lvl2pPr>
+    <a:lvl3pPr marL="931042" algn="l" defTabSz="931042" rtl="0" eaLnBrk="1" latinLnBrk="0" hangingPunct="1">
+      <a:defRPr sz="1200" kern="1200">
+        <a:solidFill>
+          <a:schemeClr val="tx1"/>
+        </a:solidFill>
+        <a:latin typeface="+mn-lt"/>
+        <a:ea typeface="+mn-ea"/>
+        <a:cs typeface="+mn-cs"/>
+      </a:defRPr>
+    </a:lvl3pPr>
+    <a:lvl4pPr marL="1396563" algn="l" defTabSz="931042" rtl="0" eaLnBrk="1" latinLnBrk="0" hangingPunct="1">
+      <a:defRPr sz="1200" kern="1200">
+        <a:solidFill>
+          <a:schemeClr val="tx1"/>
+        </a:solidFill>
+        <a:latin typeface="+mn-lt"/>
+        <a:ea typeface="+mn-ea"/>
+        <a:cs typeface="+mn-cs"/>
+      </a:defRPr>
+    </a:lvl4pPr>
+    <a:lvl5pPr marL="1862084" algn="l" defTabSz="931042" rtl="0" eaLnBrk="1" latinLnBrk="0" hangingPunct="1">
+      <a:defRPr sz="1200" kern="1200">
+        <a:solidFill>
+          <a:schemeClr val="tx1"/>
+        </a:solidFill>
+        <a:latin typeface="+mn-lt"/>
+        <a:ea typeface="+mn-ea"/>
+        <a:cs typeface="+mn-cs"/>
+      </a:defRPr>
+    </a:lvl5pPr>
+    <a:lvl6pPr marL="2327605" algn="l" defTabSz="931042" rtl="0" eaLnBrk="1" latinLnBrk="0" hangingPunct="1">
+      <a:defRPr sz="1200" kern="1200">
+        <a:solidFill>
+          <a:schemeClr val="tx1"/>
+        </a:solidFill>
+        <a:latin typeface="+mn-lt"/>
+        <a:ea typeface="+mn-ea"/>
+        <a:cs typeface="+mn-cs"/>
+      </a:defRPr>
+    </a:lvl6pPr>
+    <a:lvl7pPr marL="2793126" algn="l" defTabSz="931042" rtl="0" eaLnBrk="1" latinLnBrk="0" hangingPunct="1">
+      <a:defRPr sz="1200" kern="1200">
+        <a:solidFill>
+          <a:schemeClr val="tx1"/>
+        </a:solidFill>
+        <a:latin typeface="+mn-lt"/>
+        <a:ea typeface="+mn-ea"/>
+        <a:cs typeface="+mn-cs"/>
+      </a:defRPr>
+    </a:lvl7pPr>
+    <a:lvl8pPr marL="3258647" algn="l" defTabSz="931042" rtl="0" eaLnBrk="1" latinLnBrk="0" hangingPunct="1">
+      <a:defRPr sz="1200" kern="1200">
+        <a:solidFill>
+          <a:schemeClr val="tx1"/>
+        </a:solidFill>
+        <a:latin typeface="+mn-lt"/>
+        <a:ea typeface="+mn-ea"/>
+        <a:cs typeface="+mn-cs"/>
+      </a:defRPr>
+    </a:lvl8pPr>
+    <a:lvl9pPr marL="3724168" algn="l" defTabSz="931042" rtl="0" eaLnBrk="1" latinLnBrk="0" hangingPunct="1">
+      <a:defRPr sz="1200" kern="1200">
+        <a:solidFill>
+          <a:schemeClr val="tx1"/>
+        </a:solidFill>
+        <a:latin typeface="+mn-lt"/>
+        <a:ea typeface="+mn-ea"/>
+        <a:cs typeface="+mn-cs"/>
+      </a:defRPr>
+    </a:lvl9pPr>
+  </p:notesStyle>
+</p:notesMaster>
+</file>
+
+<file path=ppt/notesSlides/notesSlide1.xml><?xml version="1.0" encoding="utf-8"?>
+<p:notes xmlns:a="http://schemas.openxmlformats.org/drawingml/2006/main" xmlns:r="http://schemas.openxmlformats.org/officeDocument/2006/relationships" xmlns:p="http://schemas.openxmlformats.org/presentationml/2006/main">
+  <p:cSld>
+    <p:spTree>
+      <p:nvGrpSpPr>
+        <p:cNvPr id="1" name=""/>
+        <p:cNvGrpSpPr/>
+        <p:nvPr/>
+      </p:nvGrpSpPr>
+      <p:grpSpPr>
+        <a:xfrm>
+          <a:off x="0" y="0"/>
+          <a:ext cx="0" cy="0"/>
+          <a:chOff x="0" y="0"/>
+          <a:chExt cx="0" cy="0"/>
+        </a:xfrm>
+      </p:grpSpPr>
+      <p:sp>
+        <p:nvSpPr>
+          <p:cNvPr id="2" name="Espace réservé de l'image des diapositives 1"/>
+          <p:cNvSpPr>
+            <a:spLocks noGrp="1" noRot="1" noChangeAspect="1"/>
+          </p:cNvSpPr>
+          <p:nvPr>
+            <p:ph type="sldImg"/>
+          </p:nvPr>
+        </p:nvSpPr>
+        <p:spPr>
+          <a:xfrm>
+            <a:off x="-636588" y="685800"/>
+            <a:ext cx="8131176" cy="3429000"/>
+          </a:xfrm>
+        </p:spPr>
+      </p:sp>
+      <p:sp>
+        <p:nvSpPr>
+          <p:cNvPr id="3" name="Espace réservé des commentaires 2"/>
+          <p:cNvSpPr>
+            <a:spLocks noGrp="1"/>
+          </p:cNvSpPr>
+          <p:nvPr>
+            <p:ph type="body" idx="1"/>
+          </p:nvPr>
+        </p:nvSpPr>
+        <p:spPr/>
+        <p:txBody>
+          <a:bodyPr/>
+          <a:lstStyle/>
+          <a:p>
+            <a:endParaRPr lang="fr-FR" dirty="0"/>
+          </a:p>
+        </p:txBody>
+      </p:sp>
+      <p:sp>
+        <p:nvSpPr>
+          <p:cNvPr id="4" name="Espace réservé du numéro de diapositive 3"/>
+          <p:cNvSpPr>
+            <a:spLocks noGrp="1"/>
+          </p:cNvSpPr>
+          <p:nvPr>
+            <p:ph type="sldNum" sz="quarter" idx="10"/>
+          </p:nvPr>
+        </p:nvSpPr>
+        <p:spPr/>
+        <p:txBody>
+          <a:bodyPr/>
+          <a:lstStyle/>
+          <a:p>
+            <a:fld id="{42E57144-67B5-4B55-BA48-3E1BA971348D}" type="slidenum">
+              <a:rPr lang="fr-FR" smtClean="0"/>
+              <a:t>1</a:t>
+            </a:fld>
+            <a:endParaRPr lang="fr-FR"/>
+          </a:p>
+        </p:txBody>
+      </p:sp>
+    </p:spTree>
+    <p:extLst>
+      <p:ext uri="{BB962C8B-B14F-4D97-AF65-F5344CB8AC3E}">
+        <p14:creationId xmlns:p14="http://schemas.microsoft.com/office/powerpoint/2010/main" val="395831260"/>
+      </p:ext>
+    </p:extLst>
+  </p:cSld>
+  <p:clrMapOvr>
+    <a:masterClrMapping/>
+  </p:clrMapOvr>
+</p:notes>
 </file>
 
 <file path=ppt/slideLayouts/slideLayout1.xml><?xml version="1.0" encoding="utf-8"?>
@@ -136,8 +578,8 @@
         </p:nvSpPr>
         <p:spPr>
           <a:xfrm>
-            <a:off x="972146" y="1901602"/>
-            <a:ext cx="11017648" cy="1312134"/>
+            <a:off x="1120618" y="1957329"/>
+            <a:ext cx="12700315" cy="1350586"/>
           </a:xfrm>
         </p:spPr>
         <p:txBody>
@@ -164,8 +606,8 @@
         </p:nvSpPr>
         <p:spPr>
           <a:xfrm>
-            <a:off x="1944292" y="3468794"/>
-            <a:ext cx="9073357" cy="1564358"/>
+            <a:off x="2241240" y="3570447"/>
+            <a:ext cx="10459089" cy="1610202"/>
           </a:xfrm>
         </p:spPr>
         <p:txBody>
@@ -181,7 +623,7 @@
                 </a:solidFill>
               </a:defRPr>
             </a:lvl1pPr>
-            <a:lvl2pPr marL="528295" indent="0" algn="ctr">
+            <a:lvl2pPr marL="537910" indent="0" algn="ctr">
               <a:buNone/>
               <a:defRPr>
                 <a:solidFill>
@@ -191,7 +633,7 @@
                 </a:solidFill>
               </a:defRPr>
             </a:lvl2pPr>
-            <a:lvl3pPr marL="1056589" indent="0" algn="ctr">
+            <a:lvl3pPr marL="1075819" indent="0" algn="ctr">
               <a:buNone/>
               <a:defRPr>
                 <a:solidFill>
@@ -201,7 +643,7 @@
                 </a:solidFill>
               </a:defRPr>
             </a:lvl3pPr>
-            <a:lvl4pPr marL="1584884" indent="0" algn="ctr">
+            <a:lvl4pPr marL="1613729" indent="0" algn="ctr">
               <a:buNone/>
               <a:defRPr>
                 <a:solidFill>
@@ -211,7 +653,7 @@
                 </a:solidFill>
               </a:defRPr>
             </a:lvl4pPr>
-            <a:lvl5pPr marL="2113178" indent="0" algn="ctr">
+            <a:lvl5pPr marL="2151638" indent="0" algn="ctr">
               <a:buNone/>
               <a:defRPr>
                 <a:solidFill>
@@ -221,7 +663,7 @@
                 </a:solidFill>
               </a:defRPr>
             </a:lvl5pPr>
-            <a:lvl6pPr marL="2641473" indent="0" algn="ctr">
+            <a:lvl6pPr marL="2689548" indent="0" algn="ctr">
               <a:buNone/>
               <a:defRPr>
                 <a:solidFill>
@@ -231,7 +673,7 @@
                 </a:solidFill>
               </a:defRPr>
             </a:lvl6pPr>
-            <a:lvl7pPr marL="3169768" indent="0" algn="ctr">
+            <a:lvl7pPr marL="3227458" indent="0" algn="ctr">
               <a:buNone/>
               <a:defRPr>
                 <a:solidFill>
@@ -241,7 +683,7 @@
                 </a:solidFill>
               </a:defRPr>
             </a:lvl7pPr>
-            <a:lvl8pPr marL="3698062" indent="0" algn="ctr">
+            <a:lvl8pPr marL="3765367" indent="0" algn="ctr">
               <a:buNone/>
               <a:defRPr>
                 <a:solidFill>
@@ -251,7 +693,7 @@
                 </a:solidFill>
               </a:defRPr>
             </a:lvl8pPr>
-            <a:lvl9pPr marL="4226357" indent="0" algn="ctr">
+            <a:lvl9pPr marL="4303277" indent="0" algn="ctr">
               <a:buNone/>
               <a:defRPr>
                 <a:solidFill>
@@ -288,7 +730,7 @@
           <a:p>
             <a:fld id="{95A67E3B-D062-4AFC-ACCE-50FD5F000C57}" type="datetimeFigureOut">
               <a:rPr lang="fr-FR" smtClean="0"/>
-              <a:t>23/03/2017</a:t>
+              <a:t>05/04/2017</a:t>
             </a:fld>
             <a:endParaRPr lang="fr-FR"/>
           </a:p>
@@ -458,7 +900,7 @@
           <a:p>
             <a:fld id="{95A67E3B-D062-4AFC-ACCE-50FD5F000C57}" type="datetimeFigureOut">
               <a:rPr lang="fr-FR" smtClean="0"/>
-              <a:t>23/03/2017</a:t>
+              <a:t>05/04/2017</a:t>
             </a:fld>
             <a:endParaRPr lang="fr-FR"/>
           </a:p>
@@ -548,8 +990,8 @@
         </p:nvSpPr>
         <p:spPr>
           <a:xfrm>
-            <a:off x="11100911" y="192712"/>
-            <a:ext cx="3445264" cy="4113525"/>
+            <a:off x="12796297" y="198362"/>
+            <a:ext cx="3971439" cy="4234072"/>
           </a:xfrm>
         </p:spPr>
         <p:txBody>
@@ -576,8 +1018,8 @@
         </p:nvSpPr>
         <p:spPr>
           <a:xfrm>
-            <a:off x="765113" y="192712"/>
-            <a:ext cx="10119764" cy="4113525"/>
+            <a:off x="881962" y="198362"/>
+            <a:ext cx="11665309" cy="4234072"/>
           </a:xfrm>
         </p:spPr>
         <p:txBody>
@@ -638,7 +1080,7 @@
           <a:p>
             <a:fld id="{95A67E3B-D062-4AFC-ACCE-50FD5F000C57}" type="datetimeFigureOut">
               <a:rPr lang="fr-FR" smtClean="0"/>
-              <a:t>23/03/2017</a:t>
+              <a:t>05/04/2017</a:t>
             </a:fld>
             <a:endParaRPr lang="fr-FR"/>
           </a:p>
@@ -808,7 +1250,7 @@
           <a:p>
             <a:fld id="{95A67E3B-D062-4AFC-ACCE-50FD5F000C57}" type="datetimeFigureOut">
               <a:rPr lang="fr-FR" smtClean="0"/>
-              <a:t>23/03/2017</a:t>
+              <a:t>05/04/2017</a:t>
             </a:fld>
             <a:endParaRPr lang="fr-FR"/>
           </a:p>
@@ -898,15 +1340,15 @@
         </p:nvSpPr>
         <p:spPr>
           <a:xfrm>
-            <a:off x="1023904" y="3933567"/>
-            <a:ext cx="11017648" cy="1215778"/>
+            <a:off x="1180279" y="4048841"/>
+            <a:ext cx="12700315" cy="1251406"/>
           </a:xfrm>
         </p:spPr>
         <p:txBody>
           <a:bodyPr anchor="t"/>
           <a:lstStyle>
             <a:lvl1pPr algn="l">
-              <a:defRPr sz="4600" b="1" cap="all"/>
+              <a:defRPr sz="4700" b="1" cap="all"/>
             </a:lvl1pPr>
           </a:lstStyle>
           <a:p>
@@ -930,8 +1372,8 @@
         </p:nvSpPr>
         <p:spPr>
           <a:xfrm>
-            <a:off x="1023904" y="2594511"/>
-            <a:ext cx="11017648" cy="1339056"/>
+            <a:off x="1180279" y="2670544"/>
+            <a:ext cx="12700315" cy="1378297"/>
           </a:xfrm>
         </p:spPr>
         <p:txBody>
@@ -947,7 +1389,7 @@
                 </a:solidFill>
               </a:defRPr>
             </a:lvl1pPr>
-            <a:lvl2pPr marL="528295" indent="0">
+            <a:lvl2pPr marL="537910" indent="0">
               <a:buNone/>
               <a:defRPr sz="2100">
                 <a:solidFill>
@@ -957,7 +1399,7 @@
                 </a:solidFill>
               </a:defRPr>
             </a:lvl2pPr>
-            <a:lvl3pPr marL="1056589" indent="0">
+            <a:lvl3pPr marL="1075819" indent="0">
               <a:buNone/>
               <a:defRPr sz="1800">
                 <a:solidFill>
@@ -967,7 +1409,7 @@
                 </a:solidFill>
               </a:defRPr>
             </a:lvl3pPr>
-            <a:lvl4pPr marL="1584884" indent="0">
+            <a:lvl4pPr marL="1613729" indent="0">
               <a:buNone/>
               <a:defRPr sz="1600">
                 <a:solidFill>
@@ -977,7 +1419,7 @@
                 </a:solidFill>
               </a:defRPr>
             </a:lvl4pPr>
-            <a:lvl5pPr marL="2113178" indent="0">
+            <a:lvl5pPr marL="2151638" indent="0">
               <a:buNone/>
               <a:defRPr sz="1600">
                 <a:solidFill>
@@ -987,7 +1429,7 @@
                 </a:solidFill>
               </a:defRPr>
             </a:lvl5pPr>
-            <a:lvl6pPr marL="2641473" indent="0">
+            <a:lvl6pPr marL="2689548" indent="0">
               <a:buNone/>
               <a:defRPr sz="1600">
                 <a:solidFill>
@@ -997,7 +1439,7 @@
                 </a:solidFill>
               </a:defRPr>
             </a:lvl6pPr>
-            <a:lvl7pPr marL="3169768" indent="0">
+            <a:lvl7pPr marL="3227458" indent="0">
               <a:buNone/>
               <a:defRPr sz="1600">
                 <a:solidFill>
@@ -1007,7 +1449,7 @@
                 </a:solidFill>
               </a:defRPr>
             </a:lvl7pPr>
-            <a:lvl8pPr marL="3698062" indent="0">
+            <a:lvl8pPr marL="3765367" indent="0">
               <a:buNone/>
               <a:defRPr sz="1600">
                 <a:solidFill>
@@ -1017,7 +1459,7 @@
                 </a:solidFill>
               </a:defRPr>
             </a:lvl8pPr>
-            <a:lvl9pPr marL="4226357" indent="0">
+            <a:lvl9pPr marL="4303277" indent="0">
               <a:buNone/>
               <a:defRPr sz="1600">
                 <a:solidFill>
@@ -1054,7 +1496,7 @@
           <a:p>
             <a:fld id="{95A67E3B-D062-4AFC-ACCE-50FD5F000C57}" type="datetimeFigureOut">
               <a:rPr lang="fr-FR" smtClean="0"/>
-              <a:t>23/03/2017</a:t>
+              <a:t>05/04/2017</a:t>
             </a:fld>
             <a:endParaRPr lang="fr-FR"/>
           </a:p>
@@ -1167,18 +1609,18 @@
         </p:nvSpPr>
         <p:spPr>
           <a:xfrm>
-            <a:off x="765115" y="1125091"/>
-            <a:ext cx="6782514" cy="3181144"/>
+            <a:off x="881971" y="1158062"/>
+            <a:ext cx="7818374" cy="3274368"/>
           </a:xfrm>
         </p:spPr>
         <p:txBody>
           <a:bodyPr/>
           <a:lstStyle>
             <a:lvl1pPr>
-              <a:defRPr sz="3200"/>
+              <a:defRPr sz="3300"/>
             </a:lvl1pPr>
             <a:lvl2pPr>
-              <a:defRPr sz="2800"/>
+              <a:defRPr sz="2900"/>
             </a:lvl2pPr>
             <a:lvl3pPr>
               <a:defRPr sz="2300"/>
@@ -1252,18 +1694,18 @@
         </p:nvSpPr>
         <p:spPr>
           <a:xfrm>
-            <a:off x="7763662" y="1125091"/>
-            <a:ext cx="6782514" cy="3181144"/>
+            <a:off x="8949372" y="1158062"/>
+            <a:ext cx="7818374" cy="3274368"/>
           </a:xfrm>
         </p:spPr>
         <p:txBody>
           <a:bodyPr/>
           <a:lstStyle>
             <a:lvl1pPr>
-              <a:defRPr sz="3200"/>
+              <a:defRPr sz="3300"/>
             </a:lvl1pPr>
             <a:lvl2pPr>
-              <a:defRPr sz="2800"/>
+              <a:defRPr sz="2900"/>
             </a:lvl2pPr>
             <a:lvl3pPr>
               <a:defRPr sz="2300"/>
@@ -1342,7 +1784,7 @@
           <a:p>
             <a:fld id="{95A67E3B-D062-4AFC-ACCE-50FD5F000C57}" type="datetimeFigureOut">
               <a:rPr lang="fr-FR" smtClean="0"/>
-              <a:t>23/03/2017</a:t>
+              <a:t>05/04/2017</a:t>
             </a:fld>
             <a:endParaRPr lang="fr-FR"/>
           </a:p>
@@ -1432,8 +1874,8 @@
         </p:nvSpPr>
         <p:spPr>
           <a:xfrm>
-            <a:off x="648098" y="245140"/>
-            <a:ext cx="11665745" cy="1020234"/>
+            <a:off x="747079" y="252324"/>
+            <a:ext cx="13447393" cy="1050132"/>
           </a:xfrm>
         </p:spPr>
         <p:txBody>
@@ -1464,8 +1906,8 @@
         </p:nvSpPr>
         <p:spPr>
           <a:xfrm>
-            <a:off x="648097" y="1370232"/>
-            <a:ext cx="5727107" cy="571047"/>
+            <a:off x="747092" y="1410389"/>
+            <a:ext cx="6601774" cy="587782"/>
           </a:xfrm>
         </p:spPr>
         <p:txBody>
@@ -1473,37 +1915,37 @@
           <a:lstStyle>
             <a:lvl1pPr marL="0" indent="0">
               <a:buNone/>
-              <a:defRPr sz="2800" b="1"/>
+              <a:defRPr sz="2900" b="1"/>
             </a:lvl1pPr>
-            <a:lvl2pPr marL="528295" indent="0">
+            <a:lvl2pPr marL="537910" indent="0">
               <a:buNone/>
               <a:defRPr sz="2300" b="1"/>
             </a:lvl2pPr>
-            <a:lvl3pPr marL="1056589" indent="0">
+            <a:lvl3pPr marL="1075819" indent="0">
               <a:buNone/>
               <a:defRPr sz="2100" b="1"/>
             </a:lvl3pPr>
-            <a:lvl4pPr marL="1584884" indent="0">
+            <a:lvl4pPr marL="1613729" indent="0">
               <a:buNone/>
               <a:defRPr sz="1800" b="1"/>
             </a:lvl4pPr>
-            <a:lvl5pPr marL="2113178" indent="0">
+            <a:lvl5pPr marL="2151638" indent="0">
               <a:buNone/>
               <a:defRPr sz="1800" b="1"/>
             </a:lvl5pPr>
-            <a:lvl6pPr marL="2641473" indent="0">
+            <a:lvl6pPr marL="2689548" indent="0">
               <a:buNone/>
               <a:defRPr sz="1800" b="1"/>
             </a:lvl6pPr>
-            <a:lvl7pPr marL="3169768" indent="0">
+            <a:lvl7pPr marL="3227458" indent="0">
               <a:buNone/>
               <a:defRPr sz="1800" b="1"/>
             </a:lvl7pPr>
-            <a:lvl8pPr marL="3698062" indent="0">
+            <a:lvl8pPr marL="3765367" indent="0">
               <a:buNone/>
               <a:defRPr sz="1800" b="1"/>
             </a:lvl8pPr>
-            <a:lvl9pPr marL="4226357" indent="0">
+            <a:lvl9pPr marL="4303277" indent="0">
               <a:buNone/>
               <a:defRPr sz="1800" b="1"/>
             </a:lvl9pPr>
@@ -1529,15 +1971,15 @@
         </p:nvSpPr>
         <p:spPr>
           <a:xfrm>
-            <a:off x="648097" y="1941278"/>
-            <a:ext cx="5727107" cy="3526890"/>
+            <a:off x="747092" y="1998167"/>
+            <a:ext cx="6601774" cy="3630246"/>
           </a:xfrm>
         </p:spPr>
         <p:txBody>
           <a:bodyPr/>
           <a:lstStyle>
             <a:lvl1pPr>
-              <a:defRPr sz="2800"/>
+              <a:defRPr sz="2900"/>
             </a:lvl1pPr>
             <a:lvl2pPr>
               <a:defRPr sz="2300"/>
@@ -1614,8 +2056,8 @@
         </p:nvSpPr>
         <p:spPr>
           <a:xfrm>
-            <a:off x="6584486" y="1370232"/>
-            <a:ext cx="5729357" cy="571047"/>
+            <a:off x="7590103" y="1410389"/>
+            <a:ext cx="6604374" cy="587782"/>
           </a:xfrm>
         </p:spPr>
         <p:txBody>
@@ -1623,37 +2065,37 @@
           <a:lstStyle>
             <a:lvl1pPr marL="0" indent="0">
               <a:buNone/>
-              <a:defRPr sz="2800" b="1"/>
+              <a:defRPr sz="2900" b="1"/>
             </a:lvl1pPr>
-            <a:lvl2pPr marL="528295" indent="0">
+            <a:lvl2pPr marL="537910" indent="0">
               <a:buNone/>
               <a:defRPr sz="2300" b="1"/>
             </a:lvl2pPr>
-            <a:lvl3pPr marL="1056589" indent="0">
+            <a:lvl3pPr marL="1075819" indent="0">
               <a:buNone/>
               <a:defRPr sz="2100" b="1"/>
             </a:lvl3pPr>
-            <a:lvl4pPr marL="1584884" indent="0">
+            <a:lvl4pPr marL="1613729" indent="0">
               <a:buNone/>
               <a:defRPr sz="1800" b="1"/>
             </a:lvl4pPr>
-            <a:lvl5pPr marL="2113178" indent="0">
+            <a:lvl5pPr marL="2151638" indent="0">
               <a:buNone/>
               <a:defRPr sz="1800" b="1"/>
             </a:lvl5pPr>
-            <a:lvl6pPr marL="2641473" indent="0">
+            <a:lvl6pPr marL="2689548" indent="0">
               <a:buNone/>
               <a:defRPr sz="1800" b="1"/>
             </a:lvl6pPr>
-            <a:lvl7pPr marL="3169768" indent="0">
+            <a:lvl7pPr marL="3227458" indent="0">
               <a:buNone/>
               <a:defRPr sz="1800" b="1"/>
             </a:lvl7pPr>
-            <a:lvl8pPr marL="3698062" indent="0">
+            <a:lvl8pPr marL="3765367" indent="0">
               <a:buNone/>
               <a:defRPr sz="1800" b="1"/>
             </a:lvl8pPr>
-            <a:lvl9pPr marL="4226357" indent="0">
+            <a:lvl9pPr marL="4303277" indent="0">
               <a:buNone/>
               <a:defRPr sz="1800" b="1"/>
             </a:lvl9pPr>
@@ -1679,15 +2121,15 @@
         </p:nvSpPr>
         <p:spPr>
           <a:xfrm>
-            <a:off x="6584486" y="1941278"/>
-            <a:ext cx="5729357" cy="3526890"/>
+            <a:off x="7590103" y="1998167"/>
+            <a:ext cx="6604374" cy="3630246"/>
           </a:xfrm>
         </p:spPr>
         <p:txBody>
           <a:bodyPr/>
           <a:lstStyle>
             <a:lvl1pPr>
-              <a:defRPr sz="2800"/>
+              <a:defRPr sz="2900"/>
             </a:lvl1pPr>
             <a:lvl2pPr>
               <a:defRPr sz="2300"/>
@@ -1769,7 +2211,7 @@
           <a:p>
             <a:fld id="{95A67E3B-D062-4AFC-ACCE-50FD5F000C57}" type="datetimeFigureOut">
               <a:rPr lang="fr-FR" smtClean="0"/>
-              <a:t>23/03/2017</a:t>
+              <a:t>05/04/2017</a:t>
             </a:fld>
             <a:endParaRPr lang="fr-FR"/>
           </a:p>
@@ -1887,7 +2329,7 @@
           <a:p>
             <a:fld id="{95A67E3B-D062-4AFC-ACCE-50FD5F000C57}" type="datetimeFigureOut">
               <a:rPr lang="fr-FR" smtClean="0"/>
-              <a:t>23/03/2017</a:t>
+              <a:t>05/04/2017</a:t>
             </a:fld>
             <a:endParaRPr lang="fr-FR"/>
           </a:p>
@@ -1982,7 +2424,7 @@
           <a:p>
             <a:fld id="{95A67E3B-D062-4AFC-ACCE-50FD5F000C57}" type="datetimeFigureOut">
               <a:rPr lang="fr-FR" smtClean="0"/>
-              <a:t>23/03/2017</a:t>
+              <a:t>05/04/2017</a:t>
             </a:fld>
             <a:endParaRPr lang="fr-FR"/>
           </a:p>
@@ -2072,8 +2514,8 @@
         </p:nvSpPr>
         <p:spPr>
           <a:xfrm>
-            <a:off x="648097" y="243723"/>
-            <a:ext cx="4264389" cy="1037237"/>
+            <a:off x="747083" y="250873"/>
+            <a:ext cx="4915671" cy="1067633"/>
           </a:xfrm>
         </p:spPr>
         <p:txBody>
@@ -2104,21 +2546,21 @@
         </p:nvSpPr>
         <p:spPr>
           <a:xfrm>
-            <a:off x="5067759" y="243725"/>
-            <a:ext cx="7246084" cy="5224445"/>
+            <a:off x="5841740" y="250870"/>
+            <a:ext cx="8352737" cy="5377548"/>
           </a:xfrm>
         </p:spPr>
         <p:txBody>
           <a:bodyPr/>
           <a:lstStyle>
             <a:lvl1pPr>
-              <a:defRPr sz="3700"/>
+              <a:defRPr sz="3800"/>
             </a:lvl1pPr>
             <a:lvl2pPr>
-              <a:defRPr sz="3200"/>
+              <a:defRPr sz="3300"/>
             </a:lvl2pPr>
             <a:lvl3pPr>
-              <a:defRPr sz="2800"/>
+              <a:defRPr sz="2900"/>
             </a:lvl3pPr>
             <a:lvl4pPr>
               <a:defRPr sz="2300"/>
@@ -2189,8 +2631,8 @@
         </p:nvSpPr>
         <p:spPr>
           <a:xfrm>
-            <a:off x="648097" y="1280960"/>
-            <a:ext cx="4264389" cy="4187208"/>
+            <a:off x="747083" y="1318499"/>
+            <a:ext cx="4915671" cy="4309914"/>
           </a:xfrm>
         </p:spPr>
         <p:txBody>
@@ -2200,35 +2642,35 @@
               <a:buNone/>
               <a:defRPr sz="1600"/>
             </a:lvl1pPr>
-            <a:lvl2pPr marL="528295" indent="0">
+            <a:lvl2pPr marL="537910" indent="0">
               <a:buNone/>
               <a:defRPr sz="1400"/>
             </a:lvl2pPr>
-            <a:lvl3pPr marL="1056589" indent="0">
+            <a:lvl3pPr marL="1075819" indent="0">
               <a:buNone/>
               <a:defRPr sz="1200"/>
             </a:lvl3pPr>
-            <a:lvl4pPr marL="1584884" indent="0">
+            <a:lvl4pPr marL="1613729" indent="0">
               <a:buNone/>
               <a:defRPr sz="1000"/>
             </a:lvl4pPr>
-            <a:lvl5pPr marL="2113178" indent="0">
+            <a:lvl5pPr marL="2151638" indent="0">
               <a:buNone/>
               <a:defRPr sz="1000"/>
             </a:lvl5pPr>
-            <a:lvl6pPr marL="2641473" indent="0">
+            <a:lvl6pPr marL="2689548" indent="0">
               <a:buNone/>
               <a:defRPr sz="1000"/>
             </a:lvl6pPr>
-            <a:lvl7pPr marL="3169768" indent="0">
+            <a:lvl7pPr marL="3227458" indent="0">
               <a:buNone/>
               <a:defRPr sz="1000"/>
             </a:lvl7pPr>
-            <a:lvl8pPr marL="3698062" indent="0">
+            <a:lvl8pPr marL="3765367" indent="0">
               <a:buNone/>
               <a:defRPr sz="1000"/>
             </a:lvl8pPr>
-            <a:lvl9pPr marL="4226357" indent="0">
+            <a:lvl9pPr marL="4303277" indent="0">
               <a:buNone/>
               <a:defRPr sz="1000"/>
             </a:lvl9pPr>
@@ -2259,7 +2701,7 @@
           <a:p>
             <a:fld id="{95A67E3B-D062-4AFC-ACCE-50FD5F000C57}" type="datetimeFigureOut">
               <a:rPr lang="fr-FR" smtClean="0"/>
-              <a:t>23/03/2017</a:t>
+              <a:t>05/04/2017</a:t>
             </a:fld>
             <a:endParaRPr lang="fr-FR"/>
           </a:p>
@@ -2349,8 +2791,8 @@
         </p:nvSpPr>
         <p:spPr>
           <a:xfrm>
-            <a:off x="2540631" y="4284981"/>
-            <a:ext cx="7777163" cy="505866"/>
+            <a:off x="2928656" y="4410553"/>
+            <a:ext cx="8964932" cy="520690"/>
           </a:xfrm>
         </p:spPr>
         <p:txBody>
@@ -2381,8 +2823,8 @@
         </p:nvSpPr>
         <p:spPr>
           <a:xfrm>
-            <a:off x="2540631" y="546959"/>
-            <a:ext cx="7777163" cy="3672840"/>
+            <a:off x="2928656" y="562993"/>
+            <a:ext cx="8964932" cy="3780473"/>
           </a:xfrm>
         </p:spPr>
         <p:txBody>
@@ -2390,37 +2832,37 @@
           <a:lstStyle>
             <a:lvl1pPr marL="0" indent="0">
               <a:buNone/>
-              <a:defRPr sz="3700"/>
+              <a:defRPr sz="3800"/>
             </a:lvl1pPr>
-            <a:lvl2pPr marL="528295" indent="0">
-              <a:buNone/>
-              <a:defRPr sz="3200"/>
+            <a:lvl2pPr marL="537910" indent="0">
+              <a:buNone/>
+              <a:defRPr sz="3300"/>
             </a:lvl2pPr>
-            <a:lvl3pPr marL="1056589" indent="0">
-              <a:buNone/>
-              <a:defRPr sz="2800"/>
+            <a:lvl3pPr marL="1075819" indent="0">
+              <a:buNone/>
+              <a:defRPr sz="2900"/>
             </a:lvl3pPr>
-            <a:lvl4pPr marL="1584884" indent="0">
+            <a:lvl4pPr marL="1613729" indent="0">
               <a:buNone/>
               <a:defRPr sz="2300"/>
             </a:lvl4pPr>
-            <a:lvl5pPr marL="2113178" indent="0">
+            <a:lvl5pPr marL="2151638" indent="0">
               <a:buNone/>
               <a:defRPr sz="2300"/>
             </a:lvl5pPr>
-            <a:lvl6pPr marL="2641473" indent="0">
+            <a:lvl6pPr marL="2689548" indent="0">
               <a:buNone/>
               <a:defRPr sz="2300"/>
             </a:lvl6pPr>
-            <a:lvl7pPr marL="3169768" indent="0">
+            <a:lvl7pPr marL="3227458" indent="0">
               <a:buNone/>
               <a:defRPr sz="2300"/>
             </a:lvl7pPr>
-            <a:lvl8pPr marL="3698062" indent="0">
+            <a:lvl8pPr marL="3765367" indent="0">
               <a:buNone/>
               <a:defRPr sz="2300"/>
             </a:lvl8pPr>
-            <a:lvl9pPr marL="4226357" indent="0">
+            <a:lvl9pPr marL="4303277" indent="0">
               <a:buNone/>
               <a:defRPr sz="2300"/>
             </a:lvl9pPr>
@@ -2442,8 +2884,8 @@
         </p:nvSpPr>
         <p:spPr>
           <a:xfrm>
-            <a:off x="2540631" y="4790847"/>
-            <a:ext cx="7777163" cy="718414"/>
+            <a:off x="2928656" y="4931248"/>
+            <a:ext cx="8964932" cy="739467"/>
           </a:xfrm>
         </p:spPr>
         <p:txBody>
@@ -2453,35 +2895,35 @@
               <a:buNone/>
               <a:defRPr sz="1600"/>
             </a:lvl1pPr>
-            <a:lvl2pPr marL="528295" indent="0">
+            <a:lvl2pPr marL="537910" indent="0">
               <a:buNone/>
               <a:defRPr sz="1400"/>
             </a:lvl2pPr>
-            <a:lvl3pPr marL="1056589" indent="0">
+            <a:lvl3pPr marL="1075819" indent="0">
               <a:buNone/>
               <a:defRPr sz="1200"/>
             </a:lvl3pPr>
-            <a:lvl4pPr marL="1584884" indent="0">
+            <a:lvl4pPr marL="1613729" indent="0">
               <a:buNone/>
               <a:defRPr sz="1000"/>
             </a:lvl4pPr>
-            <a:lvl5pPr marL="2113178" indent="0">
+            <a:lvl5pPr marL="2151638" indent="0">
               <a:buNone/>
               <a:defRPr sz="1000"/>
             </a:lvl5pPr>
-            <a:lvl6pPr marL="2641473" indent="0">
+            <a:lvl6pPr marL="2689548" indent="0">
               <a:buNone/>
               <a:defRPr sz="1000"/>
             </a:lvl6pPr>
-            <a:lvl7pPr marL="3169768" indent="0">
+            <a:lvl7pPr marL="3227458" indent="0">
               <a:buNone/>
               <a:defRPr sz="1000"/>
             </a:lvl7pPr>
-            <a:lvl8pPr marL="3698062" indent="0">
+            <a:lvl8pPr marL="3765367" indent="0">
               <a:buNone/>
               <a:defRPr sz="1000"/>
             </a:lvl8pPr>
-            <a:lvl9pPr marL="4226357" indent="0">
+            <a:lvl9pPr marL="4303277" indent="0">
               <a:buNone/>
               <a:defRPr sz="1000"/>
             </a:lvl9pPr>
@@ -2512,7 +2954,7 @@
           <a:p>
             <a:fld id="{95A67E3B-D062-4AFC-ACCE-50FD5F000C57}" type="datetimeFigureOut">
               <a:rPr lang="fr-FR" smtClean="0"/>
-              <a:t>23/03/2017</a:t>
+              <a:t>05/04/2017</a:t>
             </a:fld>
             <a:endParaRPr lang="fr-FR"/>
           </a:p>
@@ -2607,15 +3049,15 @@
         </p:nvSpPr>
         <p:spPr>
           <a:xfrm>
-            <a:off x="648098" y="245140"/>
-            <a:ext cx="11665745" cy="1020234"/>
+            <a:off x="747079" y="252324"/>
+            <a:ext cx="13447393" cy="1050132"/>
           </a:xfrm>
           <a:prstGeom prst="rect">
             <a:avLst/>
           </a:prstGeom>
         </p:spPr>
         <p:txBody>
-          <a:bodyPr vert="horz" lIns="105659" tIns="52829" rIns="105659" bIns="52829" rtlCol="0" anchor="ctr">
+          <a:bodyPr vert="horz" lIns="107582" tIns="53790" rIns="107582" bIns="53790" rtlCol="0" anchor="ctr">
             <a:normAutofit/>
           </a:bodyPr>
           <a:lstStyle/>
@@ -2640,15 +3082,15 @@
         </p:nvSpPr>
         <p:spPr>
           <a:xfrm>
-            <a:off x="648098" y="1428328"/>
-            <a:ext cx="11665745" cy="4039841"/>
+            <a:off x="747079" y="1470193"/>
+            <a:ext cx="13447393" cy="4158229"/>
           </a:xfrm>
           <a:prstGeom prst="rect">
             <a:avLst/>
           </a:prstGeom>
         </p:spPr>
         <p:txBody>
-          <a:bodyPr vert="horz" lIns="105659" tIns="52829" rIns="105659" bIns="52829" rtlCol="0">
+          <a:bodyPr vert="horz" lIns="107582" tIns="53790" rIns="107582" bIns="53790" rtlCol="0">
             <a:normAutofit/>
           </a:bodyPr>
           <a:lstStyle/>
@@ -2702,15 +3144,15 @@
         </p:nvSpPr>
         <p:spPr>
           <a:xfrm>
-            <a:off x="648098" y="5673631"/>
-            <a:ext cx="3024453" cy="325908"/>
+            <a:off x="747079" y="5839902"/>
+            <a:ext cx="3486366" cy="335459"/>
           </a:xfrm>
           <a:prstGeom prst="rect">
             <a:avLst/>
           </a:prstGeom>
         </p:spPr>
         <p:txBody>
-          <a:bodyPr vert="horz" lIns="105659" tIns="52829" rIns="105659" bIns="52829" rtlCol="0" anchor="ctr"/>
+          <a:bodyPr vert="horz" lIns="107582" tIns="53790" rIns="107582" bIns="53790" rtlCol="0" anchor="ctr"/>
           <a:lstStyle>
             <a:lvl1pPr algn="l">
               <a:defRPr sz="1400">
@@ -2725,7 +3167,7 @@
           <a:p>
             <a:fld id="{95A67E3B-D062-4AFC-ACCE-50FD5F000C57}" type="datetimeFigureOut">
               <a:rPr lang="fr-FR" smtClean="0"/>
-              <a:t>23/03/2017</a:t>
+              <a:t>05/04/2017</a:t>
             </a:fld>
             <a:endParaRPr lang="fr-FR"/>
           </a:p>
@@ -2743,15 +3185,15 @@
         </p:nvSpPr>
         <p:spPr>
           <a:xfrm>
-            <a:off x="4428663" y="5673631"/>
-            <a:ext cx="4104614" cy="325908"/>
+            <a:off x="5105041" y="5839902"/>
+            <a:ext cx="4731488" cy="335459"/>
           </a:xfrm>
           <a:prstGeom prst="rect">
             <a:avLst/>
           </a:prstGeom>
         </p:spPr>
         <p:txBody>
-          <a:bodyPr vert="horz" lIns="105659" tIns="52829" rIns="105659" bIns="52829" rtlCol="0" anchor="ctr"/>
+          <a:bodyPr vert="horz" lIns="107582" tIns="53790" rIns="107582" bIns="53790" rtlCol="0" anchor="ctr"/>
           <a:lstStyle>
             <a:lvl1pPr algn="ctr">
               <a:defRPr sz="1400">
@@ -2780,15 +3222,15 @@
         </p:nvSpPr>
         <p:spPr>
           <a:xfrm>
-            <a:off x="9289390" y="5673631"/>
-            <a:ext cx="3024453" cy="325908"/>
+            <a:off x="10708115" y="5839902"/>
+            <a:ext cx="3486366" cy="335459"/>
           </a:xfrm>
           <a:prstGeom prst="rect">
             <a:avLst/>
           </a:prstGeom>
         </p:spPr>
         <p:txBody>
-          <a:bodyPr vert="horz" lIns="105659" tIns="52829" rIns="105659" bIns="52829" rtlCol="0" anchor="ctr"/>
+          <a:bodyPr vert="horz" lIns="107582" tIns="53790" rIns="107582" bIns="53790" rtlCol="0" anchor="ctr"/>
           <a:lstStyle>
             <a:lvl1pPr algn="r">
               <a:defRPr sz="1400">
@@ -2832,12 +3274,12 @@
   </p:sldLayoutIdLst>
   <p:txStyles>
     <p:titleStyle>
-      <a:lvl1pPr algn="ctr" defTabSz="1056589" rtl="0" eaLnBrk="1" latinLnBrk="0" hangingPunct="1">
+      <a:lvl1pPr algn="ctr" defTabSz="1075819" rtl="0" eaLnBrk="1" latinLnBrk="0" hangingPunct="1">
         <a:spcBef>
           <a:spcPct val="0"/>
         </a:spcBef>
         <a:buNone/>
-        <a:defRPr sz="5100" kern="1200">
+        <a:defRPr sz="5200" kern="1200">
           <a:solidFill>
             <a:schemeClr val="tx1"/>
           </a:solidFill>
@@ -2848,13 +3290,13 @@
       </a:lvl1pPr>
     </p:titleStyle>
     <p:bodyStyle>
-      <a:lvl1pPr marL="396221" indent="-396221" algn="l" defTabSz="1056589" rtl="0" eaLnBrk="1" latinLnBrk="0" hangingPunct="1">
+      <a:lvl1pPr marL="403432" indent="-403432" algn="l" defTabSz="1075819" rtl="0" eaLnBrk="1" latinLnBrk="0" hangingPunct="1">
         <a:spcBef>
           <a:spcPct val="20000"/>
         </a:spcBef>
         <a:buFont typeface="Arial" pitchFamily="34" charset="0"/>
         <a:buChar char="•"/>
-        <a:defRPr sz="3700" kern="1200">
+        <a:defRPr sz="3800" kern="1200">
           <a:solidFill>
             <a:schemeClr val="tx1"/>
           </a:solidFill>
@@ -2863,13 +3305,13 @@
           <a:cs typeface="+mn-cs"/>
         </a:defRPr>
       </a:lvl1pPr>
-      <a:lvl2pPr marL="858479" indent="-330184" algn="l" defTabSz="1056589" rtl="0" eaLnBrk="1" latinLnBrk="0" hangingPunct="1">
+      <a:lvl2pPr marL="874103" indent="-336193" algn="l" defTabSz="1075819" rtl="0" eaLnBrk="1" latinLnBrk="0" hangingPunct="1">
         <a:spcBef>
           <a:spcPct val="20000"/>
         </a:spcBef>
         <a:buFont typeface="Arial" pitchFamily="34" charset="0"/>
         <a:buChar char="–"/>
-        <a:defRPr sz="3200" kern="1200">
+        <a:defRPr sz="3300" kern="1200">
           <a:solidFill>
             <a:schemeClr val="tx1"/>
           </a:solidFill>
@@ -2878,13 +3320,13 @@
           <a:cs typeface="+mn-cs"/>
         </a:defRPr>
       </a:lvl2pPr>
-      <a:lvl3pPr marL="1320737" indent="-264147" algn="l" defTabSz="1056589" rtl="0" eaLnBrk="1" latinLnBrk="0" hangingPunct="1">
+      <a:lvl3pPr marL="1344774" indent="-268954" algn="l" defTabSz="1075819" rtl="0" eaLnBrk="1" latinLnBrk="0" hangingPunct="1">
         <a:spcBef>
           <a:spcPct val="20000"/>
         </a:spcBef>
         <a:buFont typeface="Arial" pitchFamily="34" charset="0"/>
         <a:buChar char="•"/>
-        <a:defRPr sz="2800" kern="1200">
+        <a:defRPr sz="2900" kern="1200">
           <a:solidFill>
             <a:schemeClr val="tx1"/>
           </a:solidFill>
@@ -2893,7 +3335,7 @@
           <a:cs typeface="+mn-cs"/>
         </a:defRPr>
       </a:lvl3pPr>
-      <a:lvl4pPr marL="1849031" indent="-264147" algn="l" defTabSz="1056589" rtl="0" eaLnBrk="1" latinLnBrk="0" hangingPunct="1">
+      <a:lvl4pPr marL="1882683" indent="-268954" algn="l" defTabSz="1075819" rtl="0" eaLnBrk="1" latinLnBrk="0" hangingPunct="1">
         <a:spcBef>
           <a:spcPct val="20000"/>
         </a:spcBef>
@@ -2908,7 +3350,7 @@
           <a:cs typeface="+mn-cs"/>
         </a:defRPr>
       </a:lvl4pPr>
-      <a:lvl5pPr marL="2377326" indent="-264147" algn="l" defTabSz="1056589" rtl="0" eaLnBrk="1" latinLnBrk="0" hangingPunct="1">
+      <a:lvl5pPr marL="2420593" indent="-268954" algn="l" defTabSz="1075819" rtl="0" eaLnBrk="1" latinLnBrk="0" hangingPunct="1">
         <a:spcBef>
           <a:spcPct val="20000"/>
         </a:spcBef>
@@ -2923,7 +3365,7 @@
           <a:cs typeface="+mn-cs"/>
         </a:defRPr>
       </a:lvl5pPr>
-      <a:lvl6pPr marL="2905620" indent="-264147" algn="l" defTabSz="1056589" rtl="0" eaLnBrk="1" latinLnBrk="0" hangingPunct="1">
+      <a:lvl6pPr marL="2958502" indent="-268954" algn="l" defTabSz="1075819" rtl="0" eaLnBrk="1" latinLnBrk="0" hangingPunct="1">
         <a:spcBef>
           <a:spcPct val="20000"/>
         </a:spcBef>
@@ -2938,7 +3380,7 @@
           <a:cs typeface="+mn-cs"/>
         </a:defRPr>
       </a:lvl6pPr>
-      <a:lvl7pPr marL="3433915" indent="-264147" algn="l" defTabSz="1056589" rtl="0" eaLnBrk="1" latinLnBrk="0" hangingPunct="1">
+      <a:lvl7pPr marL="3496412" indent="-268954" algn="l" defTabSz="1075819" rtl="0" eaLnBrk="1" latinLnBrk="0" hangingPunct="1">
         <a:spcBef>
           <a:spcPct val="20000"/>
         </a:spcBef>
@@ -2953,7 +3395,7 @@
           <a:cs typeface="+mn-cs"/>
         </a:defRPr>
       </a:lvl7pPr>
-      <a:lvl8pPr marL="3962210" indent="-264147" algn="l" defTabSz="1056589" rtl="0" eaLnBrk="1" latinLnBrk="0" hangingPunct="1">
+      <a:lvl8pPr marL="4034322" indent="-268954" algn="l" defTabSz="1075819" rtl="0" eaLnBrk="1" latinLnBrk="0" hangingPunct="1">
         <a:spcBef>
           <a:spcPct val="20000"/>
         </a:spcBef>
@@ -2968,7 +3410,7 @@
           <a:cs typeface="+mn-cs"/>
         </a:defRPr>
       </a:lvl8pPr>
-      <a:lvl9pPr marL="4490504" indent="-264147" algn="l" defTabSz="1056589" rtl="0" eaLnBrk="1" latinLnBrk="0" hangingPunct="1">
+      <a:lvl9pPr marL="4572231" indent="-268954" algn="l" defTabSz="1075819" rtl="0" eaLnBrk="1" latinLnBrk="0" hangingPunct="1">
         <a:spcBef>
           <a:spcPct val="20000"/>
         </a:spcBef>
@@ -2988,7 +3430,7 @@
       <a:defPPr>
         <a:defRPr lang="fr-FR"/>
       </a:defPPr>
-      <a:lvl1pPr marL="0" algn="l" defTabSz="1056589" rtl="0" eaLnBrk="1" latinLnBrk="0" hangingPunct="1">
+      <a:lvl1pPr marL="0" algn="l" defTabSz="1075819" rtl="0" eaLnBrk="1" latinLnBrk="0" hangingPunct="1">
         <a:defRPr sz="2100" kern="1200">
           <a:solidFill>
             <a:schemeClr val="tx1"/>
@@ -2998,7 +3440,7 @@
           <a:cs typeface="+mn-cs"/>
         </a:defRPr>
       </a:lvl1pPr>
-      <a:lvl2pPr marL="528295" algn="l" defTabSz="1056589" rtl="0" eaLnBrk="1" latinLnBrk="0" hangingPunct="1">
+      <a:lvl2pPr marL="537910" algn="l" defTabSz="1075819" rtl="0" eaLnBrk="1" latinLnBrk="0" hangingPunct="1">
         <a:defRPr sz="2100" kern="1200">
           <a:solidFill>
             <a:schemeClr val="tx1"/>
@@ -3008,7 +3450,7 @@
           <a:cs typeface="+mn-cs"/>
         </a:defRPr>
       </a:lvl2pPr>
-      <a:lvl3pPr marL="1056589" algn="l" defTabSz="1056589" rtl="0" eaLnBrk="1" latinLnBrk="0" hangingPunct="1">
+      <a:lvl3pPr marL="1075819" algn="l" defTabSz="1075819" rtl="0" eaLnBrk="1" latinLnBrk="0" hangingPunct="1">
         <a:defRPr sz="2100" kern="1200">
           <a:solidFill>
             <a:schemeClr val="tx1"/>
@@ -3018,7 +3460,7 @@
           <a:cs typeface="+mn-cs"/>
         </a:defRPr>
       </a:lvl3pPr>
-      <a:lvl4pPr marL="1584884" algn="l" defTabSz="1056589" rtl="0" eaLnBrk="1" latinLnBrk="0" hangingPunct="1">
+      <a:lvl4pPr marL="1613729" algn="l" defTabSz="1075819" rtl="0" eaLnBrk="1" latinLnBrk="0" hangingPunct="1">
         <a:defRPr sz="2100" kern="1200">
           <a:solidFill>
             <a:schemeClr val="tx1"/>
@@ -3028,7 +3470,7 @@
           <a:cs typeface="+mn-cs"/>
         </a:defRPr>
       </a:lvl4pPr>
-      <a:lvl5pPr marL="2113178" algn="l" defTabSz="1056589" rtl="0" eaLnBrk="1" latinLnBrk="0" hangingPunct="1">
+      <a:lvl5pPr marL="2151638" algn="l" defTabSz="1075819" rtl="0" eaLnBrk="1" latinLnBrk="0" hangingPunct="1">
         <a:defRPr sz="2100" kern="1200">
           <a:solidFill>
             <a:schemeClr val="tx1"/>
@@ -3038,7 +3480,7 @@
           <a:cs typeface="+mn-cs"/>
         </a:defRPr>
       </a:lvl5pPr>
-      <a:lvl6pPr marL="2641473" algn="l" defTabSz="1056589" rtl="0" eaLnBrk="1" latinLnBrk="0" hangingPunct="1">
+      <a:lvl6pPr marL="2689548" algn="l" defTabSz="1075819" rtl="0" eaLnBrk="1" latinLnBrk="0" hangingPunct="1">
         <a:defRPr sz="2100" kern="1200">
           <a:solidFill>
             <a:schemeClr val="tx1"/>
@@ -3048,7 +3490,7 @@
           <a:cs typeface="+mn-cs"/>
         </a:defRPr>
       </a:lvl6pPr>
-      <a:lvl7pPr marL="3169768" algn="l" defTabSz="1056589" rtl="0" eaLnBrk="1" latinLnBrk="0" hangingPunct="1">
+      <a:lvl7pPr marL="3227458" algn="l" defTabSz="1075819" rtl="0" eaLnBrk="1" latinLnBrk="0" hangingPunct="1">
         <a:defRPr sz="2100" kern="1200">
           <a:solidFill>
             <a:schemeClr val="tx1"/>
@@ -3058,7 +3500,7 @@
           <a:cs typeface="+mn-cs"/>
         </a:defRPr>
       </a:lvl7pPr>
-      <a:lvl8pPr marL="3698062" algn="l" defTabSz="1056589" rtl="0" eaLnBrk="1" latinLnBrk="0" hangingPunct="1">
+      <a:lvl8pPr marL="3765367" algn="l" defTabSz="1075819" rtl="0" eaLnBrk="1" latinLnBrk="0" hangingPunct="1">
         <a:defRPr sz="2100" kern="1200">
           <a:solidFill>
             <a:schemeClr val="tx1"/>
@@ -3068,7 +3510,7 @@
           <a:cs typeface="+mn-cs"/>
         </a:defRPr>
       </a:lvl8pPr>
-      <a:lvl9pPr marL="4226357" algn="l" defTabSz="1056589" rtl="0" eaLnBrk="1" latinLnBrk="0" hangingPunct="1">
+      <a:lvl9pPr marL="4303277" algn="l" defTabSz="1075819" rtl="0" eaLnBrk="1" latinLnBrk="0" hangingPunct="1">
         <a:defRPr sz="2100" kern="1200">
           <a:solidFill>
             <a:schemeClr val="tx1"/>
@@ -3102,14 +3544,14 @@
       </p:grpSpPr>
       <p:pic>
         <p:nvPicPr>
-          <p:cNvPr id="23" name="Picture 2"/>
+          <p:cNvPr id="89" name="Picture 7"/>
           <p:cNvPicPr>
             <a:picLocks noChangeAspect="1" noChangeArrowheads="1"/>
           </p:cNvPicPr>
           <p:nvPr/>
         </p:nvPicPr>
         <p:blipFill>
-          <a:blip r:embed="rId2">
+          <a:blip r:embed="rId3">
             <a:extLst>
               <a:ext uri="{28A0092B-C50C-407E-A947-70E740481C1C}">
                 <a14:useLocalDpi xmlns:a14="http://schemas.microsoft.com/office/drawing/2010/main" val="0"/>
@@ -3123,8 +3565,8 @@
         </p:blipFill>
         <p:spPr bwMode="auto">
           <a:xfrm>
-            <a:off x="0" y="-35644"/>
-            <a:ext cx="9231313" cy="3317875"/>
+            <a:off x="288000" y="51138"/>
+            <a:ext cx="9532800" cy="3416911"/>
           </a:xfrm>
           <a:prstGeom prst="rect">
             <a:avLst/>
@@ -3166,29 +3608,27 @@
       </p:pic>
       <p:pic>
         <p:nvPicPr>
-          <p:cNvPr id="1029" name="Picture 5"/>
+          <p:cNvPr id="90" name="Picture 10"/>
           <p:cNvPicPr>
             <a:picLocks noChangeAspect="1" noChangeArrowheads="1"/>
           </p:cNvPicPr>
           <p:nvPr/>
         </p:nvPicPr>
-        <p:blipFill>
-          <a:blip r:embed="rId3">
+        <p:blipFill rotWithShape="1">
+          <a:blip r:embed="rId4">
             <a:extLst>
               <a:ext uri="{28A0092B-C50C-407E-A947-70E740481C1C}">
                 <a14:useLocalDpi xmlns:a14="http://schemas.microsoft.com/office/drawing/2010/main" val="0"/>
               </a:ext>
             </a:extLst>
           </a:blip>
-          <a:srcRect/>
-          <a:stretch>
-            <a:fillRect/>
-          </a:stretch>
+          <a:srcRect l="2936" b="4507"/>
+          <a:stretch/>
         </p:blipFill>
         <p:spPr bwMode="auto">
           <a:xfrm>
-            <a:off x="8913600" y="-1588"/>
-            <a:ext cx="4160901" cy="6120000"/>
+            <a:off x="9581628" y="18907"/>
+            <a:ext cx="5450136" cy="1688771"/>
           </a:xfrm>
           <a:prstGeom prst="rect">
             <a:avLst/>
@@ -3230,14 +3670,14 @@
       </p:pic>
       <p:pic>
         <p:nvPicPr>
-          <p:cNvPr id="25" name="Picture 3"/>
+          <p:cNvPr id="91" name="Picture 3"/>
           <p:cNvPicPr>
             <a:picLocks noChangeAspect="1" noChangeArrowheads="1"/>
           </p:cNvPicPr>
           <p:nvPr/>
         </p:nvPicPr>
         <p:blipFill>
-          <a:blip r:embed="rId4">
+          <a:blip r:embed="rId5">
             <a:extLst>
               <a:ext uri="{28A0092B-C50C-407E-A947-70E740481C1C}">
                 <a14:useLocalDpi xmlns:a14="http://schemas.microsoft.com/office/drawing/2010/main" val="0"/>
@@ -3251,7 +3691,7 @@
         </p:blipFill>
         <p:spPr bwMode="auto">
           <a:xfrm>
-            <a:off x="3987923" y="3656731"/>
+            <a:off x="4428902" y="3744738"/>
             <a:ext cx="5408613" cy="2500313"/>
           </a:xfrm>
           <a:prstGeom prst="rect">
@@ -3292,16 +3732,436 @@
           </a:extLst>
         </p:spPr>
       </p:pic>
+      <p:pic>
+        <p:nvPicPr>
+          <p:cNvPr id="92" name="Picture 2"/>
+          <p:cNvPicPr>
+            <a:picLocks noChangeAspect="1" noChangeArrowheads="1"/>
+          </p:cNvPicPr>
+          <p:nvPr/>
+        </p:nvPicPr>
+        <p:blipFill rotWithShape="1">
+          <a:blip r:embed="rId6">
+            <a:extLst>
+              <a:ext uri="{28A0092B-C50C-407E-A947-70E740481C1C}">
+                <a14:useLocalDpi xmlns:a14="http://schemas.microsoft.com/office/drawing/2010/main" val="0"/>
+              </a:ext>
+            </a:extLst>
+          </a:blip>
+          <a:srcRect r="1712"/>
+          <a:stretch/>
+        </p:blipFill>
+        <p:spPr bwMode="auto">
+          <a:xfrm>
+            <a:off x="-107999" y="3744738"/>
+            <a:ext cx="5328990" cy="2502000"/>
+          </a:xfrm>
+          <a:prstGeom prst="rect">
+            <a:avLst/>
+          </a:prstGeom>
+          <a:noFill/>
+          <a:ln>
+            <a:noFill/>
+          </a:ln>
+          <a:effectLst/>
+          <a:extLst>
+            <a:ext uri="{909E8E84-426E-40DD-AFC4-6F175D3DCCD1}">
+              <a14:hiddenFill xmlns:a14="http://schemas.microsoft.com/office/drawing/2010/main">
+                <a:solidFill>
+                  <a:schemeClr val="accent1"/>
+                </a:solidFill>
+              </a14:hiddenFill>
+            </a:ext>
+            <a:ext uri="{91240B29-F687-4F45-9708-019B960494DF}">
+              <a14:hiddenLine xmlns:a14="http://schemas.microsoft.com/office/drawing/2010/main" w="9525">
+                <a:solidFill>
+                  <a:schemeClr val="tx1"/>
+                </a:solidFill>
+                <a:miter lim="800000"/>
+                <a:headEnd/>
+                <a:tailEnd/>
+              </a14:hiddenLine>
+            </a:ext>
+            <a:ext uri="{AF507438-7753-43E0-B8FC-AC1667EBCBE1}">
+              <a14:hiddenEffects xmlns:a14="http://schemas.microsoft.com/office/drawing/2010/main">
+                <a:effectLst>
+                  <a:outerShdw dist="35921" dir="2700000" algn="ctr" rotWithShape="0">
+                    <a:schemeClr val="bg2"/>
+                  </a:outerShdw>
+                </a:effectLst>
+              </a14:hiddenEffects>
+            </a:ext>
+          </a:extLst>
+        </p:spPr>
+      </p:pic>
+      <p:sp>
+        <p:nvSpPr>
+          <p:cNvPr id="93" name="ZoneTexte 92"/>
+          <p:cNvSpPr txBox="1"/>
+          <p:nvPr/>
+        </p:nvSpPr>
+        <p:spPr>
+          <a:xfrm>
+            <a:off x="846188" y="195510"/>
+            <a:ext cx="468398" cy="400110"/>
+          </a:xfrm>
+          <a:prstGeom prst="rect">
+            <a:avLst/>
+          </a:prstGeom>
+          <a:noFill/>
+        </p:spPr>
+        <p:txBody>
+          <a:bodyPr wrap="none" rtlCol="0">
+            <a:spAutoFit/>
+          </a:bodyPr>
+          <a:lstStyle/>
+          <a:p>
+            <a:r>
+              <a:rPr lang="fr-FR" sz="2000" dirty="0" smtClean="0">
+                <a:latin typeface="Times New Roman" pitchFamily="18" charset="0"/>
+                <a:cs typeface="Times New Roman" pitchFamily="18" charset="0"/>
+              </a:rPr>
+              <a:t>(a)</a:t>
+            </a:r>
+            <a:endParaRPr lang="fr-FR" sz="2000" dirty="0">
+              <a:latin typeface="Times New Roman" pitchFamily="18" charset="0"/>
+              <a:cs typeface="Times New Roman" pitchFamily="18" charset="0"/>
+            </a:endParaRPr>
+          </a:p>
+        </p:txBody>
+      </p:sp>
+      <p:sp>
+        <p:nvSpPr>
+          <p:cNvPr id="94" name="ZoneTexte 93"/>
+          <p:cNvSpPr txBox="1"/>
+          <p:nvPr/>
+        </p:nvSpPr>
+        <p:spPr>
+          <a:xfrm>
+            <a:off x="288032" y="3579836"/>
+            <a:ext cx="482824" cy="400110"/>
+          </a:xfrm>
+          <a:prstGeom prst="rect">
+            <a:avLst/>
+          </a:prstGeom>
+          <a:noFill/>
+        </p:spPr>
+        <p:txBody>
+          <a:bodyPr wrap="none" rtlCol="0">
+            <a:spAutoFit/>
+          </a:bodyPr>
+          <a:lstStyle/>
+          <a:p>
+            <a:r>
+              <a:rPr lang="fr-FR" sz="2000" dirty="0" smtClean="0">
+                <a:latin typeface="Times New Roman" pitchFamily="18" charset="0"/>
+                <a:cs typeface="Times New Roman" pitchFamily="18" charset="0"/>
+              </a:rPr>
+              <a:t>(b)</a:t>
+            </a:r>
+            <a:endParaRPr lang="fr-FR" sz="2000" dirty="0">
+              <a:latin typeface="Times New Roman" pitchFamily="18" charset="0"/>
+              <a:cs typeface="Times New Roman" pitchFamily="18" charset="0"/>
+            </a:endParaRPr>
+          </a:p>
+        </p:txBody>
+      </p:sp>
+      <p:sp>
+        <p:nvSpPr>
+          <p:cNvPr id="95" name="ZoneTexte 94"/>
+          <p:cNvSpPr txBox="1"/>
+          <p:nvPr/>
+        </p:nvSpPr>
+        <p:spPr>
+          <a:xfrm>
+            <a:off x="4810174" y="3579886"/>
+            <a:ext cx="468398" cy="400110"/>
+          </a:xfrm>
+          <a:prstGeom prst="rect">
+            <a:avLst/>
+          </a:prstGeom>
+          <a:noFill/>
+        </p:spPr>
+        <p:txBody>
+          <a:bodyPr wrap="none" rtlCol="0">
+            <a:spAutoFit/>
+          </a:bodyPr>
+          <a:lstStyle/>
+          <a:p>
+            <a:r>
+              <a:rPr lang="fr-FR" sz="2000" dirty="0" smtClean="0">
+                <a:latin typeface="Times New Roman" pitchFamily="18" charset="0"/>
+                <a:cs typeface="Times New Roman" pitchFamily="18" charset="0"/>
+              </a:rPr>
+              <a:t>(c)</a:t>
+            </a:r>
+            <a:endParaRPr lang="fr-FR" sz="2000" dirty="0">
+              <a:latin typeface="Times New Roman" pitchFamily="18" charset="0"/>
+              <a:cs typeface="Times New Roman" pitchFamily="18" charset="0"/>
+            </a:endParaRPr>
+          </a:p>
+        </p:txBody>
+      </p:sp>
+      <p:sp>
+        <p:nvSpPr>
+          <p:cNvPr id="96" name="ZoneTexte 95"/>
+          <p:cNvSpPr txBox="1"/>
+          <p:nvPr/>
+        </p:nvSpPr>
+        <p:spPr>
+          <a:xfrm>
+            <a:off x="9486653" y="-20514"/>
+            <a:ext cx="482824" cy="400110"/>
+          </a:xfrm>
+          <a:prstGeom prst="rect">
+            <a:avLst/>
+          </a:prstGeom>
+          <a:noFill/>
+        </p:spPr>
+        <p:txBody>
+          <a:bodyPr wrap="none" rtlCol="0">
+            <a:spAutoFit/>
+          </a:bodyPr>
+          <a:lstStyle/>
+          <a:p>
+            <a:r>
+              <a:rPr lang="fr-FR" sz="2000" dirty="0" smtClean="0">
+                <a:latin typeface="Times New Roman" pitchFamily="18" charset="0"/>
+                <a:cs typeface="Times New Roman" pitchFamily="18" charset="0"/>
+              </a:rPr>
+              <a:t>(d)</a:t>
+            </a:r>
+            <a:endParaRPr lang="fr-FR" sz="2000" dirty="0">
+              <a:latin typeface="Times New Roman" pitchFamily="18" charset="0"/>
+              <a:cs typeface="Times New Roman" pitchFamily="18" charset="0"/>
+            </a:endParaRPr>
+          </a:p>
+        </p:txBody>
+      </p:sp>
+      <p:grpSp>
+        <p:nvGrpSpPr>
+          <p:cNvPr id="13" name="Groupe 12"/>
+          <p:cNvGrpSpPr/>
+          <p:nvPr/>
+        </p:nvGrpSpPr>
+        <p:grpSpPr>
+          <a:xfrm>
+            <a:off x="10677053" y="1759593"/>
+            <a:ext cx="3346450" cy="4458619"/>
+            <a:chOff x="10677053" y="1759593"/>
+            <a:chExt cx="3346450" cy="4458619"/>
+          </a:xfrm>
+        </p:grpSpPr>
+        <p:pic>
+          <p:nvPicPr>
+            <p:cNvPr id="99" name="Picture 12"/>
+            <p:cNvPicPr>
+              <a:picLocks noChangeAspect="1" noChangeArrowheads="1"/>
+            </p:cNvPicPr>
+            <p:nvPr/>
+          </p:nvPicPr>
+          <p:blipFill rotWithShape="1">
+            <a:blip r:embed="rId7">
+              <a:extLst>
+                <a:ext uri="{28A0092B-C50C-407E-A947-70E740481C1C}">
+                  <a14:useLocalDpi xmlns:a14="http://schemas.microsoft.com/office/drawing/2010/main" val="0"/>
+                </a:ext>
+              </a:extLst>
+            </a:blip>
+            <a:srcRect t="4210"/>
+            <a:stretch/>
+          </p:blipFill>
+          <p:spPr bwMode="auto">
+            <a:xfrm>
+              <a:off x="10677053" y="1759593"/>
+              <a:ext cx="3346450" cy="4458619"/>
+            </a:xfrm>
+            <a:prstGeom prst="rect">
+              <a:avLst/>
+            </a:prstGeom>
+            <a:noFill/>
+            <a:ln>
+              <a:noFill/>
+            </a:ln>
+            <a:effectLst/>
+            <a:extLst>
+              <a:ext uri="{909E8E84-426E-40DD-AFC4-6F175D3DCCD1}">
+                <a14:hiddenFill xmlns:a14="http://schemas.microsoft.com/office/drawing/2010/main">
+                  <a:solidFill>
+                    <a:schemeClr val="accent1"/>
+                  </a:solidFill>
+                </a14:hiddenFill>
+              </a:ext>
+              <a:ext uri="{91240B29-F687-4F45-9708-019B960494DF}">
+                <a14:hiddenLine xmlns:a14="http://schemas.microsoft.com/office/drawing/2010/main" w="9525">
+                  <a:solidFill>
+                    <a:schemeClr val="tx1"/>
+                  </a:solidFill>
+                  <a:miter lim="800000"/>
+                  <a:headEnd/>
+                  <a:tailEnd/>
+                </a14:hiddenLine>
+              </a:ext>
+              <a:ext uri="{AF507438-7753-43E0-B8FC-AC1667EBCBE1}">
+                <a14:hiddenEffects xmlns:a14="http://schemas.microsoft.com/office/drawing/2010/main">
+                  <a:effectLst>
+                    <a:outerShdw dist="35921" dir="2700000" algn="ctr" rotWithShape="0">
+                      <a:schemeClr val="bg2"/>
+                    </a:outerShdw>
+                  </a:effectLst>
+                </a14:hiddenEffects>
+              </a:ext>
+            </a:extLst>
+          </p:spPr>
+        </p:pic>
+        <p:sp>
+          <p:nvSpPr>
+            <p:cNvPr id="97" name="Rectangle 96"/>
+            <p:cNvSpPr/>
+            <p:nvPr/>
+          </p:nvSpPr>
+          <p:spPr>
+            <a:xfrm>
+              <a:off x="11070008" y="4495154"/>
+              <a:ext cx="144016" cy="236860"/>
+            </a:xfrm>
+            <a:prstGeom prst="rect">
+              <a:avLst/>
+            </a:prstGeom>
+            <a:solidFill>
+              <a:schemeClr val="bg1"/>
+            </a:solidFill>
+            <a:ln>
+              <a:solidFill>
+                <a:schemeClr val="bg1"/>
+              </a:solidFill>
+            </a:ln>
+          </p:spPr>
+          <p:style>
+            <a:lnRef idx="2">
+              <a:schemeClr val="accent1">
+                <a:shade val="50000"/>
+              </a:schemeClr>
+            </a:lnRef>
+            <a:fillRef idx="1">
+              <a:schemeClr val="accent1"/>
+            </a:fillRef>
+            <a:effectRef idx="0">
+              <a:schemeClr val="accent1"/>
+            </a:effectRef>
+            <a:fontRef idx="minor">
+              <a:schemeClr val="lt1"/>
+            </a:fontRef>
+          </p:style>
+          <p:txBody>
+            <a:bodyPr rtlCol="0" anchor="ctr"/>
+            <a:lstStyle/>
+            <a:p>
+              <a:pPr algn="ctr"/>
+              <a:endParaRPr lang="fr-FR"/>
+            </a:p>
+          </p:txBody>
+        </p:sp>
+        <p:sp>
+          <p:nvSpPr>
+            <p:cNvPr id="98" name="Rectangle 97"/>
+            <p:cNvSpPr/>
+            <p:nvPr/>
+          </p:nvSpPr>
+          <p:spPr>
+            <a:xfrm>
+              <a:off x="10981308" y="5405672"/>
+              <a:ext cx="144016" cy="236860"/>
+            </a:xfrm>
+            <a:prstGeom prst="rect">
+              <a:avLst/>
+            </a:prstGeom>
+            <a:solidFill>
+              <a:schemeClr val="bg1"/>
+            </a:solidFill>
+            <a:ln>
+              <a:solidFill>
+                <a:schemeClr val="bg1"/>
+              </a:solidFill>
+            </a:ln>
+          </p:spPr>
+          <p:style>
+            <a:lnRef idx="2">
+              <a:schemeClr val="accent1">
+                <a:shade val="50000"/>
+              </a:schemeClr>
+            </a:lnRef>
+            <a:fillRef idx="1">
+              <a:schemeClr val="accent1"/>
+            </a:fillRef>
+            <a:effectRef idx="0">
+              <a:schemeClr val="accent1"/>
+            </a:effectRef>
+            <a:fontRef idx="minor">
+              <a:schemeClr val="lt1"/>
+            </a:fontRef>
+          </p:style>
+          <p:txBody>
+            <a:bodyPr rtlCol="0" anchor="ctr"/>
+            <a:lstStyle/>
+            <a:p>
+              <a:pPr algn="ctr"/>
+              <a:endParaRPr lang="fr-FR"/>
+            </a:p>
+          </p:txBody>
+        </p:sp>
+      </p:grpSp>
+      <p:sp>
+        <p:nvSpPr>
+          <p:cNvPr id="14" name="Rectangle 13"/>
+          <p:cNvSpPr/>
+          <p:nvPr/>
+        </p:nvSpPr>
+        <p:spPr>
+          <a:xfrm>
+            <a:off x="11503223" y="1807200"/>
+            <a:ext cx="1296144" cy="720000"/>
+          </a:xfrm>
+          <a:prstGeom prst="rect">
+            <a:avLst/>
+          </a:prstGeom>
+          <a:noFill/>
+        </p:spPr>
+        <p:style>
+          <a:lnRef idx="2">
+            <a:schemeClr val="accent1">
+              <a:shade val="50000"/>
+            </a:schemeClr>
+          </a:lnRef>
+          <a:fillRef idx="1">
+            <a:schemeClr val="accent1"/>
+          </a:fillRef>
+          <a:effectRef idx="0">
+            <a:schemeClr val="accent1"/>
+          </a:effectRef>
+          <a:fontRef idx="minor">
+            <a:schemeClr val="lt1"/>
+          </a:fontRef>
+        </p:style>
+        <p:txBody>
+          <a:bodyPr rtlCol="0" anchor="ctr"/>
+          <a:lstStyle/>
+          <a:p>
+            <a:pPr algn="ctr"/>
+            <a:endParaRPr lang="fr-FR"/>
+          </a:p>
+        </p:txBody>
+      </p:sp>
       <p:cxnSp>
         <p:nvCxnSpPr>
-          <p:cNvPr id="26" name="Connecteur droit 25"/>
+          <p:cNvPr id="16" name="Connecteur droit 15"/>
           <p:cNvCxnSpPr/>
           <p:nvPr/>
         </p:nvCxnSpPr>
         <p:spPr>
-          <a:xfrm flipH="1">
-            <a:off x="4860032" y="2484636"/>
-            <a:ext cx="2520280" cy="1368152"/>
+          <a:xfrm flipH="1" flipV="1">
+            <a:off x="10135071" y="1134170"/>
+            <a:ext cx="1368152" cy="673030"/>
           </a:xfrm>
           <a:prstGeom prst="line">
             <a:avLst/>
@@ -3325,14 +4185,14 @@
       </p:cxnSp>
       <p:cxnSp>
         <p:nvCxnSpPr>
-          <p:cNvPr id="27" name="Connecteur droit 26"/>
+          <p:cNvPr id="100" name="Connecteur droit 99"/>
           <p:cNvCxnSpPr/>
           <p:nvPr/>
         </p:nvCxnSpPr>
         <p:spPr>
-          <a:xfrm>
-            <a:off x="8532440" y="2637036"/>
-            <a:ext cx="432048" cy="1215752"/>
+          <a:xfrm flipV="1">
+            <a:off x="12799367" y="1134170"/>
+            <a:ext cx="1800200" cy="673030"/>
           </a:xfrm>
           <a:prstGeom prst="line">
             <a:avLst/>
@@ -3354,114 +4214,6 @@
           </a:fontRef>
         </p:style>
       </p:cxnSp>
-      <p:sp>
-        <p:nvSpPr>
-          <p:cNvPr id="1025" name="ZoneTexte 1024"/>
-          <p:cNvSpPr txBox="1"/>
-          <p:nvPr/>
-        </p:nvSpPr>
-        <p:spPr>
-          <a:xfrm>
-            <a:off x="648321" y="180380"/>
-            <a:ext cx="468398" cy="400110"/>
-          </a:xfrm>
-          <a:prstGeom prst="rect">
-            <a:avLst/>
-          </a:prstGeom>
-          <a:noFill/>
-        </p:spPr>
-        <p:txBody>
-          <a:bodyPr wrap="none" rtlCol="0">
-            <a:spAutoFit/>
-          </a:bodyPr>
-          <a:lstStyle/>
-          <a:p>
-            <a:r>
-              <a:rPr lang="fr-FR" sz="2000" dirty="0" smtClean="0">
-                <a:latin typeface="Times New Roman" pitchFamily="18" charset="0"/>
-                <a:cs typeface="Times New Roman" pitchFamily="18" charset="0"/>
-              </a:rPr>
-              <a:t>(a)</a:t>
-            </a:r>
-            <a:endParaRPr lang="fr-FR" sz="2000" dirty="0">
-              <a:latin typeface="Times New Roman" pitchFamily="18" charset="0"/>
-              <a:cs typeface="Times New Roman" pitchFamily="18" charset="0"/>
-            </a:endParaRPr>
-          </a:p>
-        </p:txBody>
-      </p:sp>
-      <p:sp>
-        <p:nvSpPr>
-          <p:cNvPr id="38" name="ZoneTexte 37"/>
-          <p:cNvSpPr txBox="1"/>
-          <p:nvPr/>
-        </p:nvSpPr>
-        <p:spPr>
-          <a:xfrm>
-            <a:off x="9145265" y="-35644"/>
-            <a:ext cx="468398" cy="400110"/>
-          </a:xfrm>
-          <a:prstGeom prst="rect">
-            <a:avLst/>
-          </a:prstGeom>
-          <a:noFill/>
-        </p:spPr>
-        <p:txBody>
-          <a:bodyPr wrap="none" rtlCol="0">
-            <a:spAutoFit/>
-          </a:bodyPr>
-          <a:lstStyle/>
-          <a:p>
-            <a:r>
-              <a:rPr lang="fr-FR" sz="2000" dirty="0" smtClean="0">
-                <a:latin typeface="Times New Roman" pitchFamily="18" charset="0"/>
-                <a:cs typeface="Times New Roman" pitchFamily="18" charset="0"/>
-              </a:rPr>
-              <a:t>(c)</a:t>
-            </a:r>
-            <a:endParaRPr lang="fr-FR" sz="2000" dirty="0">
-              <a:latin typeface="Times New Roman" pitchFamily="18" charset="0"/>
-              <a:cs typeface="Times New Roman" pitchFamily="18" charset="0"/>
-            </a:endParaRPr>
-          </a:p>
-        </p:txBody>
-      </p:sp>
-      <p:sp>
-        <p:nvSpPr>
-          <p:cNvPr id="39" name="ZoneTexte 38"/>
-          <p:cNvSpPr txBox="1"/>
-          <p:nvPr/>
-        </p:nvSpPr>
-        <p:spPr>
-          <a:xfrm>
-            <a:off x="4341961" y="3564756"/>
-            <a:ext cx="482824" cy="400110"/>
-          </a:xfrm>
-          <a:prstGeom prst="rect">
-            <a:avLst/>
-          </a:prstGeom>
-          <a:noFill/>
-        </p:spPr>
-        <p:txBody>
-          <a:bodyPr wrap="none" rtlCol="0">
-            <a:spAutoFit/>
-          </a:bodyPr>
-          <a:lstStyle/>
-          <a:p>
-            <a:r>
-              <a:rPr lang="fr-FR" sz="2000" dirty="0" smtClean="0">
-                <a:latin typeface="Times New Roman" pitchFamily="18" charset="0"/>
-                <a:cs typeface="Times New Roman" pitchFamily="18" charset="0"/>
-              </a:rPr>
-              <a:t>(b)</a:t>
-            </a:r>
-            <a:endParaRPr lang="fr-FR" sz="2000" dirty="0">
-              <a:latin typeface="Times New Roman" pitchFamily="18" charset="0"/>
-              <a:cs typeface="Times New Roman" pitchFamily="18" charset="0"/>
-            </a:endParaRPr>
-          </a:p>
-        </p:txBody>
-      </p:sp>
     </p:spTree>
     <p:extLst>
       <p:ext uri="{BB962C8B-B14F-4D97-AF65-F5344CB8AC3E}">
@@ -3758,4 +4510,289 @@
   <a:objectDefaults/>
   <a:extraClrSchemeLst/>
 </a:theme>
+</file>
+
+<file path=ppt/theme/theme2.xml><?xml version="1.0" encoding="utf-8"?>
+<a:theme xmlns:a="http://schemas.openxmlformats.org/drawingml/2006/main" name="Thème Office">
+  <a:themeElements>
+    <a:clrScheme name="Office">
+      <a:dk1>
+        <a:sysClr val="windowText" lastClr="000000"/>
+      </a:dk1>
+      <a:lt1>
+        <a:sysClr val="window" lastClr="FFFFFF"/>
+      </a:lt1>
+      <a:dk2>
+        <a:srgbClr val="1F497D"/>
+      </a:dk2>
+      <a:lt2>
+        <a:srgbClr val="EEECE1"/>
+      </a:lt2>
+      <a:accent1>
+        <a:srgbClr val="4F81BD"/>
+      </a:accent1>
+      <a:accent2>
+        <a:srgbClr val="C0504D"/>
+      </a:accent2>
+      <a:accent3>
+        <a:srgbClr val="9BBB59"/>
+      </a:accent3>
+      <a:accent4>
+        <a:srgbClr val="8064A2"/>
+      </a:accent4>
+      <a:accent5>
+        <a:srgbClr val="4BACC6"/>
+      </a:accent5>
+      <a:accent6>
+        <a:srgbClr val="F79646"/>
+      </a:accent6>
+      <a:hlink>
+        <a:srgbClr val="0000FF"/>
+      </a:hlink>
+      <a:folHlink>
+        <a:srgbClr val="800080"/>
+      </a:folHlink>
+    </a:clrScheme>
+    <a:fontScheme name="Office">
+      <a:majorFont>
+        <a:latin typeface="Calibri"/>
+        <a:ea typeface=""/>
+        <a:cs typeface=""/>
+        <a:font script="Jpan" typeface="ＭＳ Ｐゴシック"/>
+        <a:font script="Hang" typeface="맑은 고딕"/>
+        <a:font script="Hans" typeface="宋体"/>
+        <a:font script="Hant" typeface="新細明體"/>
+        <a:font script="Arab" typeface="Times New Roman"/>
+        <a:font script="Hebr" typeface="Times New Roman"/>
+        <a:font script="Thai" typeface="Angsana New"/>
+        <a:font script="Ethi" typeface="Nyala"/>
+        <a:font script="Beng" typeface="Vrinda"/>
+        <a:font script="Gujr" typeface="Shruti"/>
+        <a:font script="Khmr" typeface="MoolBoran"/>
+        <a:font script="Knda" typeface="Tunga"/>
+        <a:font script="Guru" typeface="Raavi"/>
+        <a:font script="Cans" typeface="Euphemia"/>
+        <a:font script="Cher" typeface="Plantagenet Cherokee"/>
+        <a:font script="Yiii" typeface="Microsoft Yi Baiti"/>
+        <a:font script="Tibt" typeface="Microsoft Himalaya"/>
+        <a:font script="Thaa" typeface="MV Boli"/>
+        <a:font script="Deva" typeface="Mangal"/>
+        <a:font script="Telu" typeface="Gautami"/>
+        <a:font script="Taml" typeface="Latha"/>
+        <a:font script="Syrc" typeface="Estrangelo Edessa"/>
+        <a:font script="Orya" typeface="Kalinga"/>
+        <a:font script="Mlym" typeface="Kartika"/>
+        <a:font script="Laoo" typeface="DokChampa"/>
+        <a:font script="Sinh" typeface="Iskoola Pota"/>
+        <a:font script="Mong" typeface="Mongolian Baiti"/>
+        <a:font script="Viet" typeface="Times New Roman"/>
+        <a:font script="Uigh" typeface="Microsoft Uighur"/>
+        <a:font script="Geor" typeface="Sylfaen"/>
+      </a:majorFont>
+      <a:minorFont>
+        <a:latin typeface="Calibri"/>
+        <a:ea typeface=""/>
+        <a:cs typeface=""/>
+        <a:font script="Jpan" typeface="ＭＳ Ｐゴシック"/>
+        <a:font script="Hang" typeface="맑은 고딕"/>
+        <a:font script="Hans" typeface="宋体"/>
+        <a:font script="Hant" typeface="新細明體"/>
+        <a:font script="Arab" typeface="Arial"/>
+        <a:font script="Hebr" typeface="Arial"/>
+        <a:font script="Thai" typeface="Cordia New"/>
+        <a:font script="Ethi" typeface="Nyala"/>
+        <a:font script="Beng" typeface="Vrinda"/>
+        <a:font script="Gujr" typeface="Shruti"/>
+        <a:font script="Khmr" typeface="DaunPenh"/>
+        <a:font script="Knda" typeface="Tunga"/>
+        <a:font script="Guru" typeface="Raavi"/>
+        <a:font script="Cans" typeface="Euphemia"/>
+        <a:font script="Cher" typeface="Plantagenet Cherokee"/>
+        <a:font script="Yiii" typeface="Microsoft Yi Baiti"/>
+        <a:font script="Tibt" typeface="Microsoft Himalaya"/>
+        <a:font script="Thaa" typeface="MV Boli"/>
+        <a:font script="Deva" typeface="Mangal"/>
+        <a:font script="Telu" typeface="Gautami"/>
+        <a:font script="Taml" typeface="Latha"/>
+        <a:font script="Syrc" typeface="Estrangelo Edessa"/>
+        <a:font script="Orya" typeface="Kalinga"/>
+        <a:font script="Mlym" typeface="Kartika"/>
+        <a:font script="Laoo" typeface="DokChampa"/>
+        <a:font script="Sinh" typeface="Iskoola Pota"/>
+        <a:font script="Mong" typeface="Mongolian Baiti"/>
+        <a:font script="Viet" typeface="Arial"/>
+        <a:font script="Uigh" typeface="Microsoft Uighur"/>
+        <a:font script="Geor" typeface="Sylfaen"/>
+      </a:minorFont>
+    </a:fontScheme>
+    <a:fmtScheme name="Office">
+      <a:fillStyleLst>
+        <a:solidFill>
+          <a:schemeClr val="phClr"/>
+        </a:solidFill>
+        <a:gradFill rotWithShape="1">
+          <a:gsLst>
+            <a:gs pos="0">
+              <a:schemeClr val="phClr">
+                <a:tint val="50000"/>
+                <a:satMod val="300000"/>
+              </a:schemeClr>
+            </a:gs>
+            <a:gs pos="35000">
+              <a:schemeClr val="phClr">
+                <a:tint val="37000"/>
+                <a:satMod val="300000"/>
+              </a:schemeClr>
+            </a:gs>
+            <a:gs pos="100000">
+              <a:schemeClr val="phClr">
+                <a:tint val="15000"/>
+                <a:satMod val="350000"/>
+              </a:schemeClr>
+            </a:gs>
+          </a:gsLst>
+          <a:lin ang="16200000" scaled="1"/>
+        </a:gradFill>
+        <a:gradFill rotWithShape="1">
+          <a:gsLst>
+            <a:gs pos="0">
+              <a:schemeClr val="phClr">
+                <a:shade val="51000"/>
+                <a:satMod val="130000"/>
+              </a:schemeClr>
+            </a:gs>
+            <a:gs pos="80000">
+              <a:schemeClr val="phClr">
+                <a:shade val="93000"/>
+                <a:satMod val="130000"/>
+              </a:schemeClr>
+            </a:gs>
+            <a:gs pos="100000">
+              <a:schemeClr val="phClr">
+                <a:shade val="94000"/>
+                <a:satMod val="135000"/>
+              </a:schemeClr>
+            </a:gs>
+          </a:gsLst>
+          <a:lin ang="16200000" scaled="0"/>
+        </a:gradFill>
+      </a:fillStyleLst>
+      <a:lnStyleLst>
+        <a:ln w="9525" cap="flat" cmpd="sng" algn="ctr">
+          <a:solidFill>
+            <a:schemeClr val="phClr">
+              <a:shade val="95000"/>
+              <a:satMod val="105000"/>
+            </a:schemeClr>
+          </a:solidFill>
+          <a:prstDash val="solid"/>
+        </a:ln>
+        <a:ln w="25400" cap="flat" cmpd="sng" algn="ctr">
+          <a:solidFill>
+            <a:schemeClr val="phClr"/>
+          </a:solidFill>
+          <a:prstDash val="solid"/>
+        </a:ln>
+        <a:ln w="38100" cap="flat" cmpd="sng" algn="ctr">
+          <a:solidFill>
+            <a:schemeClr val="phClr"/>
+          </a:solidFill>
+          <a:prstDash val="solid"/>
+        </a:ln>
+      </a:lnStyleLst>
+      <a:effectStyleLst>
+        <a:effectStyle>
+          <a:effectLst>
+            <a:outerShdw blurRad="40000" dist="20000" dir="5400000" rotWithShape="0">
+              <a:srgbClr val="000000">
+                <a:alpha val="38000"/>
+              </a:srgbClr>
+            </a:outerShdw>
+          </a:effectLst>
+        </a:effectStyle>
+        <a:effectStyle>
+          <a:effectLst>
+            <a:outerShdw blurRad="40000" dist="23000" dir="5400000" rotWithShape="0">
+              <a:srgbClr val="000000">
+                <a:alpha val="35000"/>
+              </a:srgbClr>
+            </a:outerShdw>
+          </a:effectLst>
+        </a:effectStyle>
+        <a:effectStyle>
+          <a:effectLst>
+            <a:outerShdw blurRad="40000" dist="23000" dir="5400000" rotWithShape="0">
+              <a:srgbClr val="000000">
+                <a:alpha val="35000"/>
+              </a:srgbClr>
+            </a:outerShdw>
+          </a:effectLst>
+          <a:scene3d>
+            <a:camera prst="orthographicFront">
+              <a:rot lat="0" lon="0" rev="0"/>
+            </a:camera>
+            <a:lightRig rig="threePt" dir="t">
+              <a:rot lat="0" lon="0" rev="1200000"/>
+            </a:lightRig>
+          </a:scene3d>
+          <a:sp3d>
+            <a:bevelT w="63500" h="25400"/>
+          </a:sp3d>
+        </a:effectStyle>
+      </a:effectStyleLst>
+      <a:bgFillStyleLst>
+        <a:solidFill>
+          <a:schemeClr val="phClr"/>
+        </a:solidFill>
+        <a:gradFill rotWithShape="1">
+          <a:gsLst>
+            <a:gs pos="0">
+              <a:schemeClr val="phClr">
+                <a:tint val="40000"/>
+                <a:satMod val="350000"/>
+              </a:schemeClr>
+            </a:gs>
+            <a:gs pos="40000">
+              <a:schemeClr val="phClr">
+                <a:tint val="45000"/>
+                <a:shade val="99000"/>
+                <a:satMod val="350000"/>
+              </a:schemeClr>
+            </a:gs>
+            <a:gs pos="100000">
+              <a:schemeClr val="phClr">
+                <a:shade val="20000"/>
+                <a:satMod val="255000"/>
+              </a:schemeClr>
+            </a:gs>
+          </a:gsLst>
+          <a:path path="circle">
+            <a:fillToRect l="50000" t="-80000" r="50000" b="180000"/>
+          </a:path>
+        </a:gradFill>
+        <a:gradFill rotWithShape="1">
+          <a:gsLst>
+            <a:gs pos="0">
+              <a:schemeClr val="phClr">
+                <a:tint val="80000"/>
+                <a:satMod val="300000"/>
+              </a:schemeClr>
+            </a:gs>
+            <a:gs pos="100000">
+              <a:schemeClr val="phClr">
+                <a:shade val="30000"/>
+                <a:satMod val="200000"/>
+              </a:schemeClr>
+            </a:gs>
+          </a:gsLst>
+          <a:path path="circle">
+            <a:fillToRect l="50000" t="50000" r="50000" b="50000"/>
+          </a:path>
+        </a:gradFill>
+      </a:bgFillStyleLst>
+    </a:fmtScheme>
+  </a:themeElements>
+  <a:objectDefaults/>
+  <a:extraClrSchemeLst/>
+</a:theme>
 </file>
</xml_diff>